<commit_message>
Updated identity infrastructure poster
</commit_message>
<xml_diff>
--- a/microsoft-365/downloads/m365e-identity-infra.pptx
+++ b/microsoft-365/downloads/m365e-identity-infra.pptx
@@ -224,7 +224,7 @@
           <a:p>
             <a:fld id="{F6718B09-A5BF-4500-B7D0-AD2FFA08E103}" type="datetimeFigureOut">
               <a:rPr lang="en-US" smtClean="0"/>
-              <a:t>8/4/2020</a:t>
+              <a:t>9/8/2020</a:t>
             </a:fld>
             <a:endParaRPr lang="en-US" dirty="0"/>
           </a:p>
@@ -620,7 +620,7 @@
           <a:p>
             <a:fld id="{B12B58C5-0F7F-4864-91DB-0DCB63F031BB}" type="datetimeFigureOut">
               <a:rPr lang="en-US" smtClean="0"/>
-              <a:t>8/4/2020</a:t>
+              <a:t>9/8/2020</a:t>
             </a:fld>
             <a:endParaRPr lang="en-US" dirty="0"/>
           </a:p>
@@ -788,7 +788,7 @@
           <a:p>
             <a:fld id="{B12B58C5-0F7F-4864-91DB-0DCB63F031BB}" type="datetimeFigureOut">
               <a:rPr lang="en-US" smtClean="0"/>
-              <a:t>8/4/2020</a:t>
+              <a:t>9/8/2020</a:t>
             </a:fld>
             <a:endParaRPr lang="en-US" dirty="0"/>
           </a:p>
@@ -966,7 +966,7 @@
           <a:p>
             <a:fld id="{B12B58C5-0F7F-4864-91DB-0DCB63F031BB}" type="datetimeFigureOut">
               <a:rPr lang="en-US" smtClean="0"/>
-              <a:t>8/4/2020</a:t>
+              <a:t>9/8/2020</a:t>
             </a:fld>
             <a:endParaRPr lang="en-US" dirty="0"/>
           </a:p>
@@ -1134,7 +1134,7 @@
           <a:p>
             <a:fld id="{B12B58C5-0F7F-4864-91DB-0DCB63F031BB}" type="datetimeFigureOut">
               <a:rPr lang="en-US" smtClean="0"/>
-              <a:t>8/4/2020</a:t>
+              <a:t>9/8/2020</a:t>
             </a:fld>
             <a:endParaRPr lang="en-US" dirty="0"/>
           </a:p>
@@ -1377,7 +1377,7 @@
           <a:p>
             <a:fld id="{B12B58C5-0F7F-4864-91DB-0DCB63F031BB}" type="datetimeFigureOut">
               <a:rPr lang="en-US" smtClean="0"/>
-              <a:t>8/4/2020</a:t>
+              <a:t>9/8/2020</a:t>
             </a:fld>
             <a:endParaRPr lang="en-US" dirty="0"/>
           </a:p>
@@ -1606,7 +1606,7 @@
           <a:p>
             <a:fld id="{B12B58C5-0F7F-4864-91DB-0DCB63F031BB}" type="datetimeFigureOut">
               <a:rPr lang="en-US" smtClean="0"/>
-              <a:t>8/4/2020</a:t>
+              <a:t>9/8/2020</a:t>
             </a:fld>
             <a:endParaRPr lang="en-US" dirty="0"/>
           </a:p>
@@ -1970,7 +1970,7 @@
           <a:p>
             <a:fld id="{B12B58C5-0F7F-4864-91DB-0DCB63F031BB}" type="datetimeFigureOut">
               <a:rPr lang="en-US" smtClean="0"/>
-              <a:t>8/4/2020</a:t>
+              <a:t>9/8/2020</a:t>
             </a:fld>
             <a:endParaRPr lang="en-US" dirty="0"/>
           </a:p>
@@ -2087,7 +2087,7 @@
           <a:p>
             <a:fld id="{B12B58C5-0F7F-4864-91DB-0DCB63F031BB}" type="datetimeFigureOut">
               <a:rPr lang="en-US" smtClean="0"/>
-              <a:t>8/4/2020</a:t>
+              <a:t>9/8/2020</a:t>
             </a:fld>
             <a:endParaRPr lang="en-US" dirty="0"/>
           </a:p>
@@ -2182,7 +2182,7 @@
           <a:p>
             <a:fld id="{B12B58C5-0F7F-4864-91DB-0DCB63F031BB}" type="datetimeFigureOut">
               <a:rPr lang="en-US" smtClean="0"/>
-              <a:t>8/4/2020</a:t>
+              <a:t>9/8/2020</a:t>
             </a:fld>
             <a:endParaRPr lang="en-US" dirty="0"/>
           </a:p>
@@ -2457,7 +2457,7 @@
           <a:p>
             <a:fld id="{B12B58C5-0F7F-4864-91DB-0DCB63F031BB}" type="datetimeFigureOut">
               <a:rPr lang="en-US" smtClean="0"/>
-              <a:t>8/4/2020</a:t>
+              <a:t>9/8/2020</a:t>
             </a:fld>
             <a:endParaRPr lang="en-US" dirty="0"/>
           </a:p>
@@ -2712,7 +2712,7 @@
           <a:p>
             <a:fld id="{B12B58C5-0F7F-4864-91DB-0DCB63F031BB}" type="datetimeFigureOut">
               <a:rPr lang="en-US" smtClean="0"/>
-              <a:t>8/4/2020</a:t>
+              <a:t>9/8/2020</a:t>
             </a:fld>
             <a:endParaRPr lang="en-US" dirty="0"/>
           </a:p>
@@ -2923,7 +2923,7 @@
           <a:p>
             <a:fld id="{B12B58C5-0F7F-4864-91DB-0DCB63F031BB}" type="datetimeFigureOut">
               <a:rPr lang="en-US" smtClean="0"/>
-              <a:t>8/4/2020</a:t>
+              <a:t>9/8/2020</a:t>
             </a:fld>
             <a:endParaRPr lang="en-US" dirty="0"/>
           </a:p>
@@ -6435,115 +6435,6 @@
           </a:p>
         </p:txBody>
       </p:sp>
-      <p:grpSp>
-        <p:nvGrpSpPr>
-          <p:cNvPr id="51" name="Group 50">
-            <a:extLst>
-              <a:ext uri="{FF2B5EF4-FFF2-40B4-BE49-F238E27FC236}">
-                <a16:creationId xmlns:a16="http://schemas.microsoft.com/office/drawing/2014/main" id="{9BB2991C-69BF-4AF4-8E14-B7B82D08FAC9}"/>
-              </a:ext>
-            </a:extLst>
-          </p:cNvPr>
-          <p:cNvGrpSpPr/>
-          <p:nvPr/>
-        </p:nvGrpSpPr>
-        <p:grpSpPr>
-          <a:xfrm>
-            <a:off x="3251081" y="6355808"/>
-            <a:ext cx="594678" cy="594678"/>
-            <a:chOff x="6308755" y="1819866"/>
-            <a:chExt cx="780290" cy="780290"/>
-          </a:xfrm>
-        </p:grpSpPr>
-        <p:sp>
-          <p:nvSpPr>
-            <p:cNvPr id="52" name="Rectangle 51">
-              <a:extLst>
-                <a:ext uri="{FF2B5EF4-FFF2-40B4-BE49-F238E27FC236}">
-                  <a16:creationId xmlns:a16="http://schemas.microsoft.com/office/drawing/2014/main" id="{64C1DE4A-8302-4D4C-9B90-0DACD69DD581}"/>
-                </a:ext>
-              </a:extLst>
-            </p:cNvPr>
-            <p:cNvSpPr/>
-            <p:nvPr/>
-          </p:nvSpPr>
-          <p:spPr>
-            <a:xfrm rot="19058850">
-              <a:off x="6470918" y="2003412"/>
-              <a:ext cx="469586" cy="469586"/>
-            </a:xfrm>
-            <a:prstGeom prst="rect">
-              <a:avLst/>
-            </a:prstGeom>
-            <a:solidFill>
-              <a:schemeClr val="bg1"/>
-            </a:solidFill>
-            <a:ln>
-              <a:noFill/>
-            </a:ln>
-          </p:spPr>
-          <p:style>
-            <a:lnRef idx="2">
-              <a:schemeClr val="accent1">
-                <a:shade val="50000"/>
-              </a:schemeClr>
-            </a:lnRef>
-            <a:fillRef idx="1">
-              <a:schemeClr val="accent1"/>
-            </a:fillRef>
-            <a:effectRef idx="0">
-              <a:schemeClr val="accent1"/>
-            </a:effectRef>
-            <a:fontRef idx="minor">
-              <a:schemeClr val="lt1"/>
-            </a:fontRef>
-          </p:style>
-          <p:txBody>
-            <a:bodyPr rtlCol="0" anchor="ctr"/>
-            <a:lstStyle/>
-            <a:p>
-              <a:pPr algn="ctr"/>
-              <a:endParaRPr lang="en-US" dirty="0"/>
-            </a:p>
-          </p:txBody>
-        </p:sp>
-        <p:pic>
-          <p:nvPicPr>
-            <p:cNvPr id="53" name="Picture 52">
-              <a:extLst>
-                <a:ext uri="{FF2B5EF4-FFF2-40B4-BE49-F238E27FC236}">
-                  <a16:creationId xmlns:a16="http://schemas.microsoft.com/office/drawing/2014/main" id="{EBA65877-FDF2-4E9C-95B2-0EE0585B0B69}"/>
-                </a:ext>
-              </a:extLst>
-            </p:cNvPr>
-            <p:cNvPicPr>
-              <a:picLocks noChangeAspect="1"/>
-            </p:cNvPicPr>
-            <p:nvPr/>
-          </p:nvPicPr>
-          <p:blipFill>
-            <a:blip r:embed="rId4">
-              <a:extLst>
-                <a:ext uri="{28A0092B-C50C-407E-A947-70E740481C1C}">
-                  <a14:useLocalDpi xmlns:a14="http://schemas.microsoft.com/office/drawing/2010/main" val="0"/>
-                </a:ext>
-              </a:extLst>
-            </a:blip>
-            <a:stretch>
-              <a:fillRect/>
-            </a:stretch>
-          </p:blipFill>
-          <p:spPr>
-            <a:xfrm>
-              <a:off x="6308755" y="1819866"/>
-              <a:ext cx="780290" cy="780290"/>
-            </a:xfrm>
-            <a:prstGeom prst="rect">
-              <a:avLst/>
-            </a:prstGeom>
-          </p:spPr>
-        </p:pic>
-      </p:grpSp>
       <p:sp>
         <p:nvSpPr>
           <p:cNvPr id="54" name="TextBox 53">
@@ -7755,7 +7646,7 @@
       <p:sp>
         <p:nvSpPr>
           <p:cNvPr id="7" name="TextBox 6">
-            <a:hlinkClick r:id="rId5"/>
+            <a:hlinkClick r:id="rId4"/>
             <a:extLst>
               <a:ext uri="{FF2B5EF4-FFF2-40B4-BE49-F238E27FC236}">
                 <a16:creationId xmlns:a16="http://schemas.microsoft.com/office/drawing/2014/main" id="{5CA7D597-6015-404A-AC47-30D171716315}"/>
@@ -7850,7 +7741,7 @@
       <p:sp>
         <p:nvSpPr>
           <p:cNvPr id="9" name="Rectangle 8">
-            <a:hlinkClick r:id="rId6"/>
+            <a:hlinkClick r:id="rId5"/>
             <a:extLst>
               <a:ext uri="{FF2B5EF4-FFF2-40B4-BE49-F238E27FC236}">
                 <a16:creationId xmlns:a16="http://schemas.microsoft.com/office/drawing/2014/main" id="{E70B5EBA-DE06-47AD-B8F7-9EC6CA97517B}"/>
@@ -7927,7 +7818,7 @@
       <p:sp>
         <p:nvSpPr>
           <p:cNvPr id="74" name="Rectangle 73">
-            <a:hlinkClick r:id="rId6"/>
+            <a:hlinkClick r:id="rId5"/>
             <a:extLst>
               <a:ext uri="{FF2B5EF4-FFF2-40B4-BE49-F238E27FC236}">
                 <a16:creationId xmlns:a16="http://schemas.microsoft.com/office/drawing/2014/main" id="{DB416DB7-B637-4291-820A-6007369500B6}"/>
@@ -8579,8 +8470,19 @@
                 <a:latin typeface="Segoe UI" panose="020B0502040204020203" pitchFamily="34" charset="0"/>
                 <a:cs typeface="Segoe UI" panose="020B0502040204020203" pitchFamily="34" charset="0"/>
               </a:rPr>
-              <a:t>E5 or E3 with the Identity &amp; Threat Protection offering</a:t>
+              <a:t>E5 or E3 with the Identity &amp; Threat </a:t>
             </a:r>
+            <a:r>
+              <a:rPr lang="en-US" sz="1200">
+                <a:latin typeface="Segoe UI" panose="020B0502040204020203" pitchFamily="34" charset="0"/>
+                <a:cs typeface="Segoe UI" panose="020B0502040204020203" pitchFamily="34" charset="0"/>
+              </a:rPr>
+              <a:t>Protection add-on</a:t>
+            </a:r>
+            <a:endParaRPr lang="en-US" sz="1200" dirty="0">
+              <a:latin typeface="Segoe UI" panose="020B0502040204020203" pitchFamily="34" charset="0"/>
+              <a:cs typeface="Segoe UI" panose="020B0502040204020203" pitchFamily="34" charset="0"/>
+            </a:endParaRPr>
           </a:p>
         </p:txBody>
       </p:sp>
@@ -10456,405 +10358,6 @@
           </a:p>
         </p:txBody>
       </p:sp>
-      <p:grpSp>
-        <p:nvGrpSpPr>
-          <p:cNvPr id="200" name="Group 199">
-            <a:extLst>
-              <a:ext uri="{FF2B5EF4-FFF2-40B4-BE49-F238E27FC236}">
-                <a16:creationId xmlns:a16="http://schemas.microsoft.com/office/drawing/2014/main" id="{9AC354D2-345C-4F34-A5E1-2247D43127AD}"/>
-              </a:ext>
-            </a:extLst>
-          </p:cNvPr>
-          <p:cNvGrpSpPr/>
-          <p:nvPr/>
-        </p:nvGrpSpPr>
-        <p:grpSpPr>
-          <a:xfrm>
-            <a:off x="3960610" y="13434373"/>
-            <a:ext cx="497082" cy="520024"/>
-            <a:chOff x="1892835" y="789626"/>
-            <a:chExt cx="206375" cy="215900"/>
-          </a:xfrm>
-        </p:grpSpPr>
-        <p:sp>
-          <p:nvSpPr>
-            <p:cNvPr id="197" name="Freeform 7">
-              <a:extLst>
-                <a:ext uri="{FF2B5EF4-FFF2-40B4-BE49-F238E27FC236}">
-                  <a16:creationId xmlns:a16="http://schemas.microsoft.com/office/drawing/2014/main" id="{8E25B836-8066-456B-AC3F-174E6D4DB45A}"/>
-                </a:ext>
-              </a:extLst>
-            </p:cNvPr>
-            <p:cNvSpPr>
-              <a:spLocks/>
-            </p:cNvSpPr>
-            <p:nvPr/>
-          </p:nvSpPr>
-          <p:spPr bwMode="auto">
-            <a:xfrm>
-              <a:off x="1921410" y="789626"/>
-              <a:ext cx="112713" cy="114300"/>
-            </a:xfrm>
-            <a:custGeom>
-              <a:avLst/>
-              <a:gdLst>
-                <a:gd name="T0" fmla="*/ 34 w 68"/>
-                <a:gd name="T1" fmla="*/ 68 h 68"/>
-                <a:gd name="T2" fmla="*/ 68 w 68"/>
-                <a:gd name="T3" fmla="*/ 34 h 68"/>
-                <a:gd name="T4" fmla="*/ 48 w 68"/>
-                <a:gd name="T5" fmla="*/ 3 h 68"/>
-                <a:gd name="T6" fmla="*/ 34 w 68"/>
-                <a:gd name="T7" fmla="*/ 0 h 68"/>
-                <a:gd name="T8" fmla="*/ 20 w 68"/>
-                <a:gd name="T9" fmla="*/ 3 h 68"/>
-                <a:gd name="T10" fmla="*/ 0 w 68"/>
-                <a:gd name="T11" fmla="*/ 34 h 68"/>
-                <a:gd name="T12" fmla="*/ 34 w 68"/>
-                <a:gd name="T13" fmla="*/ 68 h 68"/>
-              </a:gdLst>
-              <a:ahLst/>
-              <a:cxnLst>
-                <a:cxn ang="0">
-                  <a:pos x="T0" y="T1"/>
-                </a:cxn>
-                <a:cxn ang="0">
-                  <a:pos x="T2" y="T3"/>
-                </a:cxn>
-                <a:cxn ang="0">
-                  <a:pos x="T4" y="T5"/>
-                </a:cxn>
-                <a:cxn ang="0">
-                  <a:pos x="T6" y="T7"/>
-                </a:cxn>
-                <a:cxn ang="0">
-                  <a:pos x="T8" y="T9"/>
-                </a:cxn>
-                <a:cxn ang="0">
-                  <a:pos x="T10" y="T11"/>
-                </a:cxn>
-                <a:cxn ang="0">
-                  <a:pos x="T12" y="T13"/>
-                </a:cxn>
-              </a:cxnLst>
-              <a:rect l="0" t="0" r="r" b="b"/>
-              <a:pathLst>
-                <a:path w="68" h="68">
-                  <a:moveTo>
-                    <a:pt x="34" y="68"/>
-                  </a:moveTo>
-                  <a:cubicBezTo>
-                    <a:pt x="53" y="68"/>
-                    <a:pt x="68" y="53"/>
-                    <a:pt x="68" y="34"/>
-                  </a:cubicBezTo>
-                  <a:cubicBezTo>
-                    <a:pt x="68" y="20"/>
-                    <a:pt x="60" y="8"/>
-                    <a:pt x="48" y="3"/>
-                  </a:cubicBezTo>
-                  <a:cubicBezTo>
-                    <a:pt x="44" y="1"/>
-                    <a:pt x="39" y="0"/>
-                    <a:pt x="34" y="0"/>
-                  </a:cubicBezTo>
-                  <a:cubicBezTo>
-                    <a:pt x="29" y="0"/>
-                    <a:pt x="24" y="1"/>
-                    <a:pt x="20" y="3"/>
-                  </a:cubicBezTo>
-                  <a:cubicBezTo>
-                    <a:pt x="8" y="8"/>
-                    <a:pt x="0" y="20"/>
-                    <a:pt x="0" y="34"/>
-                  </a:cubicBezTo>
-                  <a:cubicBezTo>
-                    <a:pt x="0" y="53"/>
-                    <a:pt x="15" y="68"/>
-                    <a:pt x="34" y="68"/>
-                  </a:cubicBezTo>
-                  <a:close/>
-                </a:path>
-              </a:pathLst>
-            </a:custGeom>
-            <a:solidFill>
-              <a:srgbClr val="C2C2C2"/>
-            </a:solidFill>
-            <a:ln>
-              <a:noFill/>
-            </a:ln>
-            <a:extLst>
-              <a:ext uri="{91240B29-F687-4F45-9708-019B960494DF}">
-                <a14:hiddenLine xmlns:a14="http://schemas.microsoft.com/office/drawing/2010/main" w="9525">
-                  <a:solidFill>
-                    <a:srgbClr val="000000"/>
-                  </a:solidFill>
-                  <a:round/>
-                  <a:headEnd/>
-                  <a:tailEnd/>
-                </a14:hiddenLine>
-              </a:ext>
-            </a:extLst>
-          </p:spPr>
-          <p:txBody>
-            <a:bodyPr vert="horz" wrap="square" lIns="122047" tIns="61024" rIns="122047" bIns="61024" numCol="1" anchor="t" anchorCtr="0" compatLnSpc="1">
-              <a:prstTxWarp prst="textNoShape">
-                <a:avLst/>
-              </a:prstTxWarp>
-            </a:bodyPr>
-            <a:lstStyle/>
-            <a:p>
-              <a:endParaRPr lang="en-US" sz="3206" dirty="0"/>
-            </a:p>
-          </p:txBody>
-        </p:sp>
-        <p:sp>
-          <p:nvSpPr>
-            <p:cNvPr id="198" name="Freeform 8">
-              <a:extLst>
-                <a:ext uri="{FF2B5EF4-FFF2-40B4-BE49-F238E27FC236}">
-                  <a16:creationId xmlns:a16="http://schemas.microsoft.com/office/drawing/2014/main" id="{97BC1EBC-A292-4BA5-9546-5F32AEC34760}"/>
-                </a:ext>
-              </a:extLst>
-            </p:cNvPr>
-            <p:cNvSpPr>
-              <a:spLocks/>
-            </p:cNvSpPr>
-            <p:nvPr/>
-          </p:nvSpPr>
-          <p:spPr bwMode="auto">
-            <a:xfrm>
-              <a:off x="1892835" y="918213"/>
-              <a:ext cx="169863" cy="87313"/>
-            </a:xfrm>
-            <a:custGeom>
-              <a:avLst/>
-              <a:gdLst>
-                <a:gd name="T0" fmla="*/ 52 w 103"/>
-                <a:gd name="T1" fmla="*/ 0 h 52"/>
-                <a:gd name="T2" fmla="*/ 0 w 103"/>
-                <a:gd name="T3" fmla="*/ 52 h 52"/>
-                <a:gd name="T4" fmla="*/ 103 w 103"/>
-                <a:gd name="T5" fmla="*/ 52 h 52"/>
-                <a:gd name="T6" fmla="*/ 52 w 103"/>
-                <a:gd name="T7" fmla="*/ 0 h 52"/>
-              </a:gdLst>
-              <a:ahLst/>
-              <a:cxnLst>
-                <a:cxn ang="0">
-                  <a:pos x="T0" y="T1"/>
-                </a:cxn>
-                <a:cxn ang="0">
-                  <a:pos x="T2" y="T3"/>
-                </a:cxn>
-                <a:cxn ang="0">
-                  <a:pos x="T4" y="T5"/>
-                </a:cxn>
-                <a:cxn ang="0">
-                  <a:pos x="T6" y="T7"/>
-                </a:cxn>
-              </a:cxnLst>
-              <a:rect l="0" t="0" r="r" b="b"/>
-              <a:pathLst>
-                <a:path w="103" h="52">
-                  <a:moveTo>
-                    <a:pt x="52" y="0"/>
-                  </a:moveTo>
-                  <a:cubicBezTo>
-                    <a:pt x="23" y="0"/>
-                    <a:pt x="0" y="23"/>
-                    <a:pt x="0" y="52"/>
-                  </a:cubicBezTo>
-                  <a:cubicBezTo>
-                    <a:pt x="103" y="52"/>
-                    <a:pt x="103" y="52"/>
-                    <a:pt x="103" y="52"/>
-                  </a:cubicBezTo>
-                  <a:cubicBezTo>
-                    <a:pt x="103" y="23"/>
-                    <a:pt x="80" y="0"/>
-                    <a:pt x="52" y="0"/>
-                  </a:cubicBezTo>
-                  <a:close/>
-                </a:path>
-              </a:pathLst>
-            </a:custGeom>
-            <a:solidFill>
-              <a:srgbClr val="C2C2C2"/>
-            </a:solidFill>
-            <a:ln>
-              <a:noFill/>
-            </a:ln>
-            <a:extLst>
-              <a:ext uri="{91240B29-F687-4F45-9708-019B960494DF}">
-                <a14:hiddenLine xmlns:a14="http://schemas.microsoft.com/office/drawing/2010/main" w="9525">
-                  <a:solidFill>
-                    <a:srgbClr val="000000"/>
-                  </a:solidFill>
-                  <a:round/>
-                  <a:headEnd/>
-                  <a:tailEnd/>
-                </a14:hiddenLine>
-              </a:ext>
-            </a:extLst>
-          </p:spPr>
-          <p:txBody>
-            <a:bodyPr vert="horz" wrap="square" lIns="122047" tIns="61024" rIns="122047" bIns="61024" numCol="1" anchor="t" anchorCtr="0" compatLnSpc="1">
-              <a:prstTxWarp prst="textNoShape">
-                <a:avLst/>
-              </a:prstTxWarp>
-            </a:bodyPr>
-            <a:lstStyle/>
-            <a:p>
-              <a:endParaRPr lang="en-US" sz="3206" dirty="0"/>
-            </a:p>
-          </p:txBody>
-        </p:sp>
-        <p:sp>
-          <p:nvSpPr>
-            <p:cNvPr id="199" name="Freeform 9">
-              <a:extLst>
-                <a:ext uri="{FF2B5EF4-FFF2-40B4-BE49-F238E27FC236}">
-                  <a16:creationId xmlns:a16="http://schemas.microsoft.com/office/drawing/2014/main" id="{9E76CEAC-8762-4650-9562-A5E851495774}"/>
-                </a:ext>
-              </a:extLst>
-            </p:cNvPr>
-            <p:cNvSpPr>
-              <a:spLocks/>
-            </p:cNvSpPr>
-            <p:nvPr/>
-          </p:nvSpPr>
-          <p:spPr bwMode="auto">
-            <a:xfrm>
-              <a:off x="2043647" y="876938"/>
-              <a:ext cx="55563" cy="57150"/>
-            </a:xfrm>
-            <a:custGeom>
-              <a:avLst/>
-              <a:gdLst>
-                <a:gd name="T0" fmla="*/ 27 w 35"/>
-                <a:gd name="T1" fmla="*/ 15 h 36"/>
-                <a:gd name="T2" fmla="*/ 6 w 35"/>
-                <a:gd name="T3" fmla="*/ 36 h 36"/>
-                <a:gd name="T4" fmla="*/ 0 w 35"/>
-                <a:gd name="T5" fmla="*/ 30 h 36"/>
-                <a:gd name="T6" fmla="*/ 20 w 35"/>
-                <a:gd name="T7" fmla="*/ 9 h 36"/>
-                <a:gd name="T8" fmla="*/ 6 w 35"/>
-                <a:gd name="T9" fmla="*/ 9 h 36"/>
-                <a:gd name="T10" fmla="*/ 6 w 35"/>
-                <a:gd name="T11" fmla="*/ 0 h 36"/>
-                <a:gd name="T12" fmla="*/ 35 w 35"/>
-                <a:gd name="T13" fmla="*/ 0 h 36"/>
-                <a:gd name="T14" fmla="*/ 35 w 35"/>
-                <a:gd name="T15" fmla="*/ 30 h 36"/>
-                <a:gd name="T16" fmla="*/ 27 w 35"/>
-                <a:gd name="T17" fmla="*/ 30 h 36"/>
-                <a:gd name="T18" fmla="*/ 27 w 35"/>
-                <a:gd name="T19" fmla="*/ 15 h 36"/>
-              </a:gdLst>
-              <a:ahLst/>
-              <a:cxnLst>
-                <a:cxn ang="0">
-                  <a:pos x="T0" y="T1"/>
-                </a:cxn>
-                <a:cxn ang="0">
-                  <a:pos x="T2" y="T3"/>
-                </a:cxn>
-                <a:cxn ang="0">
-                  <a:pos x="T4" y="T5"/>
-                </a:cxn>
-                <a:cxn ang="0">
-                  <a:pos x="T6" y="T7"/>
-                </a:cxn>
-                <a:cxn ang="0">
-                  <a:pos x="T8" y="T9"/>
-                </a:cxn>
-                <a:cxn ang="0">
-                  <a:pos x="T10" y="T11"/>
-                </a:cxn>
-                <a:cxn ang="0">
-                  <a:pos x="T12" y="T13"/>
-                </a:cxn>
-                <a:cxn ang="0">
-                  <a:pos x="T14" y="T15"/>
-                </a:cxn>
-                <a:cxn ang="0">
-                  <a:pos x="T16" y="T17"/>
-                </a:cxn>
-                <a:cxn ang="0">
-                  <a:pos x="T18" y="T19"/>
-                </a:cxn>
-              </a:cxnLst>
-              <a:rect l="0" t="0" r="r" b="b"/>
-              <a:pathLst>
-                <a:path w="35" h="36">
-                  <a:moveTo>
-                    <a:pt x="27" y="15"/>
-                  </a:moveTo>
-                  <a:lnTo>
-                    <a:pt x="6" y="36"/>
-                  </a:lnTo>
-                  <a:lnTo>
-                    <a:pt x="0" y="30"/>
-                  </a:lnTo>
-                  <a:lnTo>
-                    <a:pt x="20" y="9"/>
-                  </a:lnTo>
-                  <a:lnTo>
-                    <a:pt x="6" y="9"/>
-                  </a:lnTo>
-                  <a:lnTo>
-                    <a:pt x="6" y="0"/>
-                  </a:lnTo>
-                  <a:lnTo>
-                    <a:pt x="35" y="0"/>
-                  </a:lnTo>
-                  <a:lnTo>
-                    <a:pt x="35" y="30"/>
-                  </a:lnTo>
-                  <a:lnTo>
-                    <a:pt x="27" y="30"/>
-                  </a:lnTo>
-                  <a:lnTo>
-                    <a:pt x="27" y="15"/>
-                  </a:lnTo>
-                  <a:close/>
-                </a:path>
-              </a:pathLst>
-            </a:custGeom>
-            <a:solidFill>
-              <a:srgbClr val="D83B01"/>
-            </a:solidFill>
-            <a:ln>
-              <a:noFill/>
-            </a:ln>
-            <a:extLst>
-              <a:ext uri="{91240B29-F687-4F45-9708-019B960494DF}">
-                <a14:hiddenLine xmlns:a14="http://schemas.microsoft.com/office/drawing/2010/main" w="9525">
-                  <a:solidFill>
-                    <a:srgbClr val="000000"/>
-                  </a:solidFill>
-                  <a:round/>
-                  <a:headEnd/>
-                  <a:tailEnd/>
-                </a14:hiddenLine>
-              </a:ext>
-            </a:extLst>
-          </p:spPr>
-          <p:txBody>
-            <a:bodyPr vert="horz" wrap="square" lIns="122047" tIns="61024" rIns="122047" bIns="61024" numCol="1" anchor="t" anchorCtr="0" compatLnSpc="1">
-              <a:prstTxWarp prst="textNoShape">
-                <a:avLst/>
-              </a:prstTxWarp>
-            </a:bodyPr>
-            <a:lstStyle/>
-            <a:p>
-              <a:endParaRPr lang="en-US" sz="3206" dirty="0"/>
-            </a:p>
-          </p:txBody>
-        </p:sp>
-      </p:grpSp>
       <p:sp>
         <p:nvSpPr>
           <p:cNvPr id="202" name="TextBox 201">
@@ -14366,13 +13869,13 @@
           <p:nvPr/>
         </p:nvPicPr>
         <p:blipFill>
-          <a:blip r:embed="rId7">
+          <a:blip r:embed="rId6">
             <a:extLst>
               <a:ext uri="{28A0092B-C50C-407E-A947-70E740481C1C}">
                 <a14:useLocalDpi xmlns:a14="http://schemas.microsoft.com/office/drawing/2010/main" val="0"/>
               </a:ext>
               <a:ext uri="{96DAC541-7B7A-43D3-8B79-37D633B846F1}">
-                <asvg:svgBlip xmlns:asvg="http://schemas.microsoft.com/office/drawing/2016/SVG/main" r:embed="rId8"/>
+                <asvg:svgBlip xmlns:asvg="http://schemas.microsoft.com/office/drawing/2016/SVG/main" r:embed="rId7"/>
               </a:ext>
             </a:extLst>
           </a:blip>
@@ -14405,13 +13908,13 @@
           <p:nvPr/>
         </p:nvPicPr>
         <p:blipFill>
-          <a:blip r:embed="rId9">
+          <a:blip r:embed="rId8">
             <a:extLst>
               <a:ext uri="{28A0092B-C50C-407E-A947-70E740481C1C}">
                 <a14:useLocalDpi xmlns:a14="http://schemas.microsoft.com/office/drawing/2010/main" val="0"/>
               </a:ext>
               <a:ext uri="{96DAC541-7B7A-43D3-8B79-37D633B846F1}">
-                <asvg:svgBlip xmlns:asvg="http://schemas.microsoft.com/office/drawing/2016/SVG/main" r:embed="rId10"/>
+                <asvg:svgBlip xmlns:asvg="http://schemas.microsoft.com/office/drawing/2016/SVG/main" r:embed="rId9"/>
               </a:ext>
             </a:extLst>
           </a:blip>
@@ -15230,94 +14733,6 @@
           </a:p>
         </p:txBody>
       </p:sp>
-      <p:sp>
-        <p:nvSpPr>
-          <p:cNvPr id="26" name="Rectangle 25">
-            <a:extLst>
-              <a:ext uri="{FF2B5EF4-FFF2-40B4-BE49-F238E27FC236}">
-                <a16:creationId xmlns:a16="http://schemas.microsoft.com/office/drawing/2014/main" id="{9C7A2FE1-6312-4174-81B0-47D334616580}"/>
-              </a:ext>
-            </a:extLst>
-          </p:cNvPr>
-          <p:cNvSpPr/>
-          <p:nvPr/>
-        </p:nvSpPr>
-        <p:spPr>
-          <a:xfrm rot="18711775">
-            <a:off x="7003380" y="11846460"/>
-            <a:ext cx="449580" cy="445608"/>
-          </a:xfrm>
-          <a:prstGeom prst="rect">
-            <a:avLst/>
-          </a:prstGeom>
-          <a:solidFill>
-            <a:schemeClr val="bg1"/>
-          </a:solidFill>
-          <a:ln>
-            <a:noFill/>
-          </a:ln>
-        </p:spPr>
-        <p:style>
-          <a:lnRef idx="2">
-            <a:schemeClr val="accent1">
-              <a:shade val="50000"/>
-            </a:schemeClr>
-          </a:lnRef>
-          <a:fillRef idx="1">
-            <a:schemeClr val="accent1"/>
-          </a:fillRef>
-          <a:effectRef idx="0">
-            <a:schemeClr val="accent1"/>
-          </a:effectRef>
-          <a:fontRef idx="minor">
-            <a:schemeClr val="lt1"/>
-          </a:fontRef>
-        </p:style>
-        <p:txBody>
-          <a:bodyPr rtlCol="0" anchor="ctr"/>
-          <a:lstStyle/>
-          <a:p>
-            <a:pPr algn="ctr"/>
-            <a:endParaRPr lang="en-US" dirty="0"/>
-          </a:p>
-        </p:txBody>
-      </p:sp>
-      <p:pic>
-        <p:nvPicPr>
-          <p:cNvPr id="153" name="Picture 152">
-            <a:extLst>
-              <a:ext uri="{FF2B5EF4-FFF2-40B4-BE49-F238E27FC236}">
-                <a16:creationId xmlns:a16="http://schemas.microsoft.com/office/drawing/2014/main" id="{DD5DF5FA-98EF-4F21-92D6-122C33D69596}"/>
-              </a:ext>
-            </a:extLst>
-          </p:cNvPr>
-          <p:cNvPicPr>
-            <a:picLocks noChangeAspect="1"/>
-          </p:cNvPicPr>
-          <p:nvPr/>
-        </p:nvPicPr>
-        <p:blipFill>
-          <a:blip r:embed="rId4">
-            <a:extLst>
-              <a:ext uri="{28A0092B-C50C-407E-A947-70E740481C1C}">
-                <a14:useLocalDpi xmlns:a14="http://schemas.microsoft.com/office/drawing/2010/main" val="0"/>
-              </a:ext>
-            </a:extLst>
-          </a:blip>
-          <a:stretch>
-            <a:fillRect/>
-          </a:stretch>
-        </p:blipFill>
-        <p:spPr>
-          <a:xfrm>
-            <a:off x="6848296" y="11650004"/>
-            <a:ext cx="780290" cy="780290"/>
-          </a:xfrm>
-          <a:prstGeom prst="rect">
-            <a:avLst/>
-          </a:prstGeom>
-        </p:spPr>
-      </p:pic>
       <p:pic>
         <p:nvPicPr>
           <p:cNvPr id="211" name="Graphic 210">
@@ -15333,13 +14748,13 @@
           <p:nvPr/>
         </p:nvPicPr>
         <p:blipFill>
-          <a:blip r:embed="rId11">
+          <a:blip r:embed="rId10">
             <a:extLst>
               <a:ext uri="{28A0092B-C50C-407E-A947-70E740481C1C}">
                 <a14:useLocalDpi xmlns:a14="http://schemas.microsoft.com/office/drawing/2010/main" val="0"/>
               </a:ext>
               <a:ext uri="{96DAC541-7B7A-43D3-8B79-37D633B846F1}">
-                <asvg:svgBlip xmlns:asvg="http://schemas.microsoft.com/office/drawing/2016/SVG/main" r:embed="rId12"/>
+                <asvg:svgBlip xmlns:asvg="http://schemas.microsoft.com/office/drawing/2016/SVG/main" r:embed="rId11"/>
               </a:ext>
             </a:extLst>
           </a:blip>
@@ -15458,13 +14873,13 @@
           <p:nvPr/>
         </p:nvPicPr>
         <p:blipFill>
-          <a:blip r:embed="rId11">
+          <a:blip r:embed="rId10">
             <a:extLst>
               <a:ext uri="{28A0092B-C50C-407E-A947-70E740481C1C}">
                 <a14:useLocalDpi xmlns:a14="http://schemas.microsoft.com/office/drawing/2010/main" val="0"/>
               </a:ext>
               <a:ext uri="{96DAC541-7B7A-43D3-8B79-37D633B846F1}">
-                <asvg:svgBlip xmlns:asvg="http://schemas.microsoft.com/office/drawing/2016/SVG/main" r:embed="rId12"/>
+                <asvg:svgBlip xmlns:asvg="http://schemas.microsoft.com/office/drawing/2016/SVG/main" r:embed="rId11"/>
               </a:ext>
             </a:extLst>
           </a:blip>
@@ -15497,13 +14912,13 @@
           <p:nvPr/>
         </p:nvPicPr>
         <p:blipFill>
-          <a:blip r:embed="rId11">
+          <a:blip r:embed="rId10">
             <a:extLst>
               <a:ext uri="{28A0092B-C50C-407E-A947-70E740481C1C}">
                 <a14:useLocalDpi xmlns:a14="http://schemas.microsoft.com/office/drawing/2010/main" val="0"/>
               </a:ext>
               <a:ext uri="{96DAC541-7B7A-43D3-8B79-37D633B846F1}">
-                <asvg:svgBlip xmlns:asvg="http://schemas.microsoft.com/office/drawing/2016/SVG/main" r:embed="rId12"/>
+                <asvg:svgBlip xmlns:asvg="http://schemas.microsoft.com/office/drawing/2016/SVG/main" r:embed="rId11"/>
               </a:ext>
             </a:extLst>
           </a:blip>
@@ -16367,7 +15782,7 @@
         <p:spPr>
           <a:xfrm>
             <a:off x="6172200" y="14973707"/>
-            <a:ext cx="3568156" cy="276999"/>
+            <a:ext cx="3568156" cy="461665"/>
           </a:xfrm>
           <a:prstGeom prst="rect">
             <a:avLst/>
@@ -16380,6 +15795,7 @@
           </a:bodyPr>
           <a:lstStyle/>
           <a:p>
+            <a:pPr algn="r"/>
             <a:r>
               <a:rPr lang="en-US" sz="1200" b="0" i="0" u="none" strike="noStrike" baseline="0" dirty="0">
                 <a:solidFill>
@@ -16387,7 +15803,28 @@
                 </a:solidFill>
                 <a:latin typeface="Segoe UI" panose="020B0502040204020203" pitchFamily="34" charset="0"/>
               </a:rPr>
-              <a:t>© 2019 Microsoft Corporation. All rights reserved.</a:t>
+              <a:t>© 2019 Microsoft Corporation. All rights </a:t>
+            </a:r>
+            <a:r>
+              <a:rPr lang="en-US" sz="1200" b="0" i="0" u="none" strike="noStrike" baseline="0">
+                <a:solidFill>
+                  <a:srgbClr val="7F7F7F"/>
+                </a:solidFill>
+                <a:latin typeface="Segoe UI" panose="020B0502040204020203" pitchFamily="34" charset="0"/>
+              </a:rPr>
+              <a:t>reserved.</a:t>
+            </a:r>
+          </a:p>
+          <a:p>
+            <a:pPr algn="r"/>
+            <a:r>
+              <a:rPr lang="en-US" sz="1200">
+                <a:solidFill>
+                  <a:srgbClr val="7F7F7F"/>
+                </a:solidFill>
+                <a:latin typeface="Segoe UI" panose="020B0502040204020203" pitchFamily="34" charset="0"/>
+              </a:rPr>
+              <a:t>September 2020</a:t>
             </a:r>
             <a:endParaRPr lang="en-US" sz="1200" dirty="0"/>
           </a:p>
@@ -16396,7 +15833,7 @@
       <p:sp>
         <p:nvSpPr>
           <p:cNvPr id="3" name="Rectangle 2">
-            <a:hlinkClick r:id="rId13"/>
+            <a:hlinkClick r:id="rId12"/>
             <a:extLst>
               <a:ext uri="{FF2B5EF4-FFF2-40B4-BE49-F238E27FC236}">
                 <a16:creationId xmlns:a16="http://schemas.microsoft.com/office/drawing/2014/main" id="{C2AC77CF-B4A3-4657-B13E-A11BCC5077C4}"/>
@@ -16504,7 +15941,7 @@
           <p:nvPr/>
         </p:nvPicPr>
         <p:blipFill>
-          <a:blip r:embed="rId14"/>
+          <a:blip r:embed="rId13"/>
           <a:stretch>
             <a:fillRect/>
           </a:stretch>
@@ -16513,6 +15950,96 @@
           <a:xfrm>
             <a:off x="140252" y="51808"/>
             <a:ext cx="1468062" cy="380081"/>
+          </a:xfrm>
+          <a:prstGeom prst="rect">
+            <a:avLst/>
+          </a:prstGeom>
+        </p:spPr>
+      </p:pic>
+      <p:pic>
+        <p:nvPicPr>
+          <p:cNvPr id="15" name="Picture 14">
+            <a:extLst>
+              <a:ext uri="{FF2B5EF4-FFF2-40B4-BE49-F238E27FC236}">
+                <a16:creationId xmlns:a16="http://schemas.microsoft.com/office/drawing/2014/main" id="{5EB26458-2896-4D24-BEF1-FEEF0FDE75DA}"/>
+              </a:ext>
+            </a:extLst>
+          </p:cNvPr>
+          <p:cNvPicPr>
+            <a:picLocks noChangeAspect="1"/>
+          </p:cNvPicPr>
+          <p:nvPr/>
+        </p:nvPicPr>
+        <p:blipFill>
+          <a:blip r:embed="rId14"/>
+          <a:stretch>
+            <a:fillRect/>
+          </a:stretch>
+        </p:blipFill>
+        <p:spPr>
+          <a:xfrm>
+            <a:off x="3171287" y="6336292"/>
+            <a:ext cx="680540" cy="626097"/>
+          </a:xfrm>
+          <a:prstGeom prst="rect">
+            <a:avLst/>
+          </a:prstGeom>
+        </p:spPr>
+      </p:pic>
+      <p:pic>
+        <p:nvPicPr>
+          <p:cNvPr id="17" name="Picture 16">
+            <a:extLst>
+              <a:ext uri="{FF2B5EF4-FFF2-40B4-BE49-F238E27FC236}">
+                <a16:creationId xmlns:a16="http://schemas.microsoft.com/office/drawing/2014/main" id="{928ADE57-945B-496B-B292-AF3F02CB42C6}"/>
+              </a:ext>
+            </a:extLst>
+          </p:cNvPr>
+          <p:cNvPicPr>
+            <a:picLocks noChangeAspect="1"/>
+          </p:cNvPicPr>
+          <p:nvPr/>
+        </p:nvPicPr>
+        <p:blipFill>
+          <a:blip r:embed="rId15"/>
+          <a:stretch>
+            <a:fillRect/>
+          </a:stretch>
+        </p:blipFill>
+        <p:spPr>
+          <a:xfrm>
+            <a:off x="3875358" y="13324007"/>
+            <a:ext cx="692639" cy="698317"/>
+          </a:xfrm>
+          <a:prstGeom prst="rect">
+            <a:avLst/>
+          </a:prstGeom>
+        </p:spPr>
+      </p:pic>
+      <p:pic>
+        <p:nvPicPr>
+          <p:cNvPr id="175" name="Picture 174">
+            <a:extLst>
+              <a:ext uri="{FF2B5EF4-FFF2-40B4-BE49-F238E27FC236}">
+                <a16:creationId xmlns:a16="http://schemas.microsoft.com/office/drawing/2014/main" id="{A6AE38AA-13E8-45C4-9390-2205917444CA}"/>
+              </a:ext>
+            </a:extLst>
+          </p:cNvPr>
+          <p:cNvPicPr>
+            <a:picLocks noChangeAspect="1"/>
+          </p:cNvPicPr>
+          <p:nvPr/>
+        </p:nvPicPr>
+        <p:blipFill>
+          <a:blip r:embed="rId14"/>
+          <a:stretch>
+            <a:fillRect/>
+          </a:stretch>
+        </p:blipFill>
+        <p:spPr>
+          <a:xfrm>
+            <a:off x="6871377" y="11656199"/>
+            <a:ext cx="789574" cy="726408"/>
           </a:xfrm>
           <a:prstGeom prst="rect">
             <a:avLst/>
@@ -18073,732 +17600,6 @@
           </p:txBody>
         </p:sp>
       </p:grpSp>
-      <p:grpSp>
-        <p:nvGrpSpPr>
-          <p:cNvPr id="90" name="Group 89">
-            <a:extLst>
-              <a:ext uri="{FF2B5EF4-FFF2-40B4-BE49-F238E27FC236}">
-                <a16:creationId xmlns:a16="http://schemas.microsoft.com/office/drawing/2014/main" id="{D3EE9FAB-7E2A-477C-BC25-7F9126F0E611}"/>
-              </a:ext>
-            </a:extLst>
-          </p:cNvPr>
-          <p:cNvGrpSpPr/>
-          <p:nvPr/>
-        </p:nvGrpSpPr>
-        <p:grpSpPr>
-          <a:xfrm>
-            <a:off x="5185710" y="2595007"/>
-            <a:ext cx="4260500" cy="2003605"/>
-            <a:chOff x="366694" y="2453183"/>
-            <a:chExt cx="1656924" cy="807144"/>
-          </a:xfrm>
-        </p:grpSpPr>
-        <p:grpSp>
-          <p:nvGrpSpPr>
-            <p:cNvPr id="91" name="Group 90">
-              <a:extLst>
-                <a:ext uri="{FF2B5EF4-FFF2-40B4-BE49-F238E27FC236}">
-                  <a16:creationId xmlns:a16="http://schemas.microsoft.com/office/drawing/2014/main" id="{5FADC32F-18D2-4EEC-BA99-4F51343A1DE2}"/>
-                </a:ext>
-              </a:extLst>
-            </p:cNvPr>
-            <p:cNvGrpSpPr/>
-            <p:nvPr/>
-          </p:nvGrpSpPr>
-          <p:grpSpPr>
-            <a:xfrm>
-              <a:off x="366694" y="2453183"/>
-              <a:ext cx="1656924" cy="807144"/>
-              <a:chOff x="1367782" y="2458726"/>
-              <a:chExt cx="1656924" cy="807144"/>
-            </a:xfrm>
-          </p:grpSpPr>
-          <p:sp>
-            <p:nvSpPr>
-              <p:cNvPr id="93" name="Rectangle 353">
-                <a:extLst>
-                  <a:ext uri="{FF2B5EF4-FFF2-40B4-BE49-F238E27FC236}">
-                    <a16:creationId xmlns:a16="http://schemas.microsoft.com/office/drawing/2014/main" id="{60F2EC73-1A4F-441C-B62D-C5AEF8B8E2C6}"/>
-                  </a:ext>
-                </a:extLst>
-              </p:cNvPr>
-              <p:cNvSpPr>
-                <a:spLocks noChangeArrowheads="1"/>
-              </p:cNvSpPr>
-              <p:nvPr/>
-            </p:nvSpPr>
-            <p:spPr bwMode="auto">
-              <a:xfrm>
-                <a:off x="1367782" y="2636836"/>
-                <a:ext cx="1656924" cy="629034"/>
-              </a:xfrm>
-              <a:prstGeom prst="rect">
-                <a:avLst/>
-              </a:prstGeom>
-              <a:solidFill>
-                <a:srgbClr val="F6F6F6"/>
-              </a:solidFill>
-              <a:ln w="19050">
-                <a:solidFill>
-                  <a:srgbClr val="D2D2D2"/>
-                </a:solidFill>
-                <a:prstDash val="lgDash"/>
-              </a:ln>
-            </p:spPr>
-            <p:txBody>
-              <a:bodyPr vert="horz" wrap="square" lIns="122047" tIns="61024" rIns="122047" bIns="61024" numCol="1" anchor="t" anchorCtr="0" compatLnSpc="1">
-                <a:prstTxWarp prst="textNoShape">
-                  <a:avLst/>
-                </a:prstTxWarp>
-              </a:bodyPr>
-              <a:lstStyle/>
-              <a:p>
-                <a:endParaRPr lang="en-US" sz="3206" dirty="0"/>
-              </a:p>
-            </p:txBody>
-          </p:sp>
-          <p:sp>
-            <p:nvSpPr>
-              <p:cNvPr id="94" name="Rectangle 359">
-                <a:extLst>
-                  <a:ext uri="{FF2B5EF4-FFF2-40B4-BE49-F238E27FC236}">
-                    <a16:creationId xmlns:a16="http://schemas.microsoft.com/office/drawing/2014/main" id="{CBD4F5EA-9374-4A8E-BB41-0602CE58D9BE}"/>
-                  </a:ext>
-                </a:extLst>
-              </p:cNvPr>
-              <p:cNvSpPr>
-                <a:spLocks noChangeArrowheads="1"/>
-              </p:cNvSpPr>
-              <p:nvPr/>
-            </p:nvSpPr>
-            <p:spPr bwMode="auto">
-              <a:xfrm>
-                <a:off x="1367782" y="2458726"/>
-                <a:ext cx="1656296" cy="153946"/>
-              </a:xfrm>
-              <a:prstGeom prst="rect">
-                <a:avLst/>
-              </a:prstGeom>
-              <a:solidFill>
-                <a:srgbClr val="0072C6"/>
-              </a:solidFill>
-              <a:ln>
-                <a:noFill/>
-              </a:ln>
-            </p:spPr>
-            <p:txBody>
-              <a:bodyPr vert="horz" wrap="square" lIns="122047" tIns="61024" rIns="122047" bIns="61024" numCol="1" anchor="t" anchorCtr="0" compatLnSpc="1">
-                <a:prstTxWarp prst="textNoShape">
-                  <a:avLst/>
-                </a:prstTxWarp>
-              </a:bodyPr>
-              <a:lstStyle/>
-              <a:p>
-                <a:endParaRPr lang="en-US" sz="3206" dirty="0"/>
-              </a:p>
-            </p:txBody>
-          </p:sp>
-        </p:grpSp>
-        <p:sp>
-          <p:nvSpPr>
-            <p:cNvPr id="92" name="Rectangle 954">
-              <a:extLst>
-                <a:ext uri="{FF2B5EF4-FFF2-40B4-BE49-F238E27FC236}">
-                  <a16:creationId xmlns:a16="http://schemas.microsoft.com/office/drawing/2014/main" id="{C4BDE4F4-EBDF-4C8C-8FC7-FB9A18F3561B}"/>
-                </a:ext>
-              </a:extLst>
-            </p:cNvPr>
-            <p:cNvSpPr>
-              <a:spLocks noChangeArrowheads="1"/>
-            </p:cNvSpPr>
-            <p:nvPr/>
-          </p:nvSpPr>
-          <p:spPr bwMode="auto">
-            <a:xfrm>
-              <a:off x="414701" y="2480034"/>
-              <a:ext cx="1342308" cy="99189"/>
-            </a:xfrm>
-            <a:prstGeom prst="rect">
-              <a:avLst/>
-            </a:prstGeom>
-            <a:noFill/>
-            <a:ln>
-              <a:noFill/>
-            </a:ln>
-            <a:extLst>
-              <a:ext uri="{909E8E84-426E-40DD-AFC4-6F175D3DCCD1}">
-                <a14:hiddenFill xmlns:a14="http://schemas.microsoft.com/office/drawing/2010/main">
-                  <a:solidFill>
-                    <a:srgbClr val="FFFFFF"/>
-                  </a:solidFill>
-                </a14:hiddenFill>
-              </a:ext>
-              <a:ext uri="{91240B29-F687-4F45-9708-019B960494DF}">
-                <a14:hiddenLine xmlns:a14="http://schemas.microsoft.com/office/drawing/2010/main" w="9525">
-                  <a:solidFill>
-                    <a:srgbClr val="000000"/>
-                  </a:solidFill>
-                  <a:miter lim="800000"/>
-                  <a:headEnd/>
-                  <a:tailEnd/>
-                </a14:hiddenLine>
-              </a:ext>
-            </a:extLst>
-          </p:spPr>
-          <p:txBody>
-            <a:bodyPr vert="horz" wrap="square" lIns="0" tIns="0" rIns="0" bIns="0" numCol="1" anchor="t" anchorCtr="0" compatLnSpc="1">
-              <a:prstTxWarp prst="textNoShape">
-                <a:avLst/>
-              </a:prstTxWarp>
-              <a:spAutoFit/>
-            </a:bodyPr>
-            <a:lstStyle>
-              <a:lvl1pPr eaLnBrk="0" fontAlgn="base" hangingPunct="0">
-                <a:spcBef>
-                  <a:spcPct val="0"/>
-                </a:spcBef>
-                <a:spcAft>
-                  <a:spcPct val="0"/>
-                </a:spcAft>
-                <a:defRPr>
-                  <a:solidFill>
-                    <a:schemeClr val="tx1"/>
-                  </a:solidFill>
-                  <a:latin typeface="Arial" panose="020B0604020202020204" pitchFamily="34" charset="0"/>
-                </a:defRPr>
-              </a:lvl1pPr>
-              <a:lvl2pPr eaLnBrk="0" fontAlgn="base" hangingPunct="0">
-                <a:spcBef>
-                  <a:spcPct val="0"/>
-                </a:spcBef>
-                <a:spcAft>
-                  <a:spcPct val="0"/>
-                </a:spcAft>
-                <a:defRPr>
-                  <a:solidFill>
-                    <a:schemeClr val="tx1"/>
-                  </a:solidFill>
-                  <a:latin typeface="Arial" panose="020B0604020202020204" pitchFamily="34" charset="0"/>
-                </a:defRPr>
-              </a:lvl2pPr>
-              <a:lvl3pPr eaLnBrk="0" fontAlgn="base" hangingPunct="0">
-                <a:spcBef>
-                  <a:spcPct val="0"/>
-                </a:spcBef>
-                <a:spcAft>
-                  <a:spcPct val="0"/>
-                </a:spcAft>
-                <a:defRPr>
-                  <a:solidFill>
-                    <a:schemeClr val="tx1"/>
-                  </a:solidFill>
-                  <a:latin typeface="Arial" panose="020B0604020202020204" pitchFamily="34" charset="0"/>
-                </a:defRPr>
-              </a:lvl3pPr>
-              <a:lvl4pPr eaLnBrk="0" fontAlgn="base" hangingPunct="0">
-                <a:spcBef>
-                  <a:spcPct val="0"/>
-                </a:spcBef>
-                <a:spcAft>
-                  <a:spcPct val="0"/>
-                </a:spcAft>
-                <a:defRPr>
-                  <a:solidFill>
-                    <a:schemeClr val="tx1"/>
-                  </a:solidFill>
-                  <a:latin typeface="Arial" panose="020B0604020202020204" pitchFamily="34" charset="0"/>
-                </a:defRPr>
-              </a:lvl4pPr>
-              <a:lvl5pPr eaLnBrk="0" fontAlgn="base" hangingPunct="0">
-                <a:spcBef>
-                  <a:spcPct val="0"/>
-                </a:spcBef>
-                <a:spcAft>
-                  <a:spcPct val="0"/>
-                </a:spcAft>
-                <a:defRPr>
-                  <a:solidFill>
-                    <a:schemeClr val="tx1"/>
-                  </a:solidFill>
-                  <a:latin typeface="Arial" panose="020B0604020202020204" pitchFamily="34" charset="0"/>
-                </a:defRPr>
-              </a:lvl5pPr>
-              <a:lvl6pPr eaLnBrk="0" fontAlgn="base" hangingPunct="0">
-                <a:spcBef>
-                  <a:spcPct val="0"/>
-                </a:spcBef>
-                <a:spcAft>
-                  <a:spcPct val="0"/>
-                </a:spcAft>
-                <a:defRPr>
-                  <a:solidFill>
-                    <a:schemeClr val="tx1"/>
-                  </a:solidFill>
-                  <a:latin typeface="Arial" panose="020B0604020202020204" pitchFamily="34" charset="0"/>
-                </a:defRPr>
-              </a:lvl6pPr>
-              <a:lvl7pPr eaLnBrk="0" fontAlgn="base" hangingPunct="0">
-                <a:spcBef>
-                  <a:spcPct val="0"/>
-                </a:spcBef>
-                <a:spcAft>
-                  <a:spcPct val="0"/>
-                </a:spcAft>
-                <a:defRPr>
-                  <a:solidFill>
-                    <a:schemeClr val="tx1"/>
-                  </a:solidFill>
-                  <a:latin typeface="Arial" panose="020B0604020202020204" pitchFamily="34" charset="0"/>
-                </a:defRPr>
-              </a:lvl7pPr>
-              <a:lvl8pPr eaLnBrk="0" fontAlgn="base" hangingPunct="0">
-                <a:spcBef>
-                  <a:spcPct val="0"/>
-                </a:spcBef>
-                <a:spcAft>
-                  <a:spcPct val="0"/>
-                </a:spcAft>
-                <a:defRPr>
-                  <a:solidFill>
-                    <a:schemeClr val="tx1"/>
-                  </a:solidFill>
-                  <a:latin typeface="Arial" panose="020B0604020202020204" pitchFamily="34" charset="0"/>
-                </a:defRPr>
-              </a:lvl8pPr>
-              <a:lvl9pPr eaLnBrk="0" fontAlgn="base" hangingPunct="0">
-                <a:spcBef>
-                  <a:spcPct val="0"/>
-                </a:spcBef>
-                <a:spcAft>
-                  <a:spcPct val="0"/>
-                </a:spcAft>
-                <a:defRPr>
-                  <a:solidFill>
-                    <a:schemeClr val="tx1"/>
-                  </a:solidFill>
-                  <a:latin typeface="Arial" panose="020B0604020202020204" pitchFamily="34" charset="0"/>
-                </a:defRPr>
-              </a:lvl9pPr>
-            </a:lstStyle>
-            <a:p>
-              <a:pPr defTabSz="1220450"/>
-              <a:r>
-                <a:rPr lang="en-US" altLang="en-US" sz="1600" dirty="0">
-                  <a:solidFill>
-                    <a:srgbClr val="FFFFFF"/>
-                  </a:solidFill>
-                  <a:latin typeface="Segoe UI" panose="020B0502040204020203" pitchFamily="34" charset="0"/>
-                  <a:cs typeface="Segoe UI" panose="020B0502040204020203" pitchFamily="34" charset="0"/>
-                </a:rPr>
-                <a:t>Your Microsoft 365 subscription</a:t>
-              </a:r>
-              <a:endParaRPr lang="en-US" altLang="en-US" sz="1600" dirty="0">
-                <a:latin typeface="Segoe UI" panose="020B0502040204020203" pitchFamily="34" charset="0"/>
-                <a:cs typeface="Segoe UI" panose="020B0502040204020203" pitchFamily="34" charset="0"/>
-              </a:endParaRPr>
-            </a:p>
-          </p:txBody>
-        </p:sp>
-      </p:grpSp>
-      <p:grpSp>
-        <p:nvGrpSpPr>
-          <p:cNvPr id="99" name="Group 98">
-            <a:extLst>
-              <a:ext uri="{FF2B5EF4-FFF2-40B4-BE49-F238E27FC236}">
-                <a16:creationId xmlns:a16="http://schemas.microsoft.com/office/drawing/2014/main" id="{094D8A7A-AB64-4046-8233-558BFD12E417}"/>
-              </a:ext>
-            </a:extLst>
-          </p:cNvPr>
-          <p:cNvGrpSpPr/>
-          <p:nvPr/>
-        </p:nvGrpSpPr>
-        <p:grpSpPr>
-          <a:xfrm>
-            <a:off x="4035873" y="3819897"/>
-            <a:ext cx="497082" cy="520024"/>
-            <a:chOff x="1892835" y="789626"/>
-            <a:chExt cx="206375" cy="215900"/>
-          </a:xfrm>
-        </p:grpSpPr>
-        <p:sp>
-          <p:nvSpPr>
-            <p:cNvPr id="100" name="Freeform 7">
-              <a:extLst>
-                <a:ext uri="{FF2B5EF4-FFF2-40B4-BE49-F238E27FC236}">
-                  <a16:creationId xmlns:a16="http://schemas.microsoft.com/office/drawing/2014/main" id="{5920BADC-F12D-4D43-B1D0-04D276F69ECA}"/>
-                </a:ext>
-              </a:extLst>
-            </p:cNvPr>
-            <p:cNvSpPr>
-              <a:spLocks/>
-            </p:cNvSpPr>
-            <p:nvPr/>
-          </p:nvSpPr>
-          <p:spPr bwMode="auto">
-            <a:xfrm>
-              <a:off x="1921410" y="789626"/>
-              <a:ext cx="112713" cy="114300"/>
-            </a:xfrm>
-            <a:custGeom>
-              <a:avLst/>
-              <a:gdLst>
-                <a:gd name="T0" fmla="*/ 34 w 68"/>
-                <a:gd name="T1" fmla="*/ 68 h 68"/>
-                <a:gd name="T2" fmla="*/ 68 w 68"/>
-                <a:gd name="T3" fmla="*/ 34 h 68"/>
-                <a:gd name="T4" fmla="*/ 48 w 68"/>
-                <a:gd name="T5" fmla="*/ 3 h 68"/>
-                <a:gd name="T6" fmla="*/ 34 w 68"/>
-                <a:gd name="T7" fmla="*/ 0 h 68"/>
-                <a:gd name="T8" fmla="*/ 20 w 68"/>
-                <a:gd name="T9" fmla="*/ 3 h 68"/>
-                <a:gd name="T10" fmla="*/ 0 w 68"/>
-                <a:gd name="T11" fmla="*/ 34 h 68"/>
-                <a:gd name="T12" fmla="*/ 34 w 68"/>
-                <a:gd name="T13" fmla="*/ 68 h 68"/>
-              </a:gdLst>
-              <a:ahLst/>
-              <a:cxnLst>
-                <a:cxn ang="0">
-                  <a:pos x="T0" y="T1"/>
-                </a:cxn>
-                <a:cxn ang="0">
-                  <a:pos x="T2" y="T3"/>
-                </a:cxn>
-                <a:cxn ang="0">
-                  <a:pos x="T4" y="T5"/>
-                </a:cxn>
-                <a:cxn ang="0">
-                  <a:pos x="T6" y="T7"/>
-                </a:cxn>
-                <a:cxn ang="0">
-                  <a:pos x="T8" y="T9"/>
-                </a:cxn>
-                <a:cxn ang="0">
-                  <a:pos x="T10" y="T11"/>
-                </a:cxn>
-                <a:cxn ang="0">
-                  <a:pos x="T12" y="T13"/>
-                </a:cxn>
-              </a:cxnLst>
-              <a:rect l="0" t="0" r="r" b="b"/>
-              <a:pathLst>
-                <a:path w="68" h="68">
-                  <a:moveTo>
-                    <a:pt x="34" y="68"/>
-                  </a:moveTo>
-                  <a:cubicBezTo>
-                    <a:pt x="53" y="68"/>
-                    <a:pt x="68" y="53"/>
-                    <a:pt x="68" y="34"/>
-                  </a:cubicBezTo>
-                  <a:cubicBezTo>
-                    <a:pt x="68" y="20"/>
-                    <a:pt x="60" y="8"/>
-                    <a:pt x="48" y="3"/>
-                  </a:cubicBezTo>
-                  <a:cubicBezTo>
-                    <a:pt x="44" y="1"/>
-                    <a:pt x="39" y="0"/>
-                    <a:pt x="34" y="0"/>
-                  </a:cubicBezTo>
-                  <a:cubicBezTo>
-                    <a:pt x="29" y="0"/>
-                    <a:pt x="24" y="1"/>
-                    <a:pt x="20" y="3"/>
-                  </a:cubicBezTo>
-                  <a:cubicBezTo>
-                    <a:pt x="8" y="8"/>
-                    <a:pt x="0" y="20"/>
-                    <a:pt x="0" y="34"/>
-                  </a:cubicBezTo>
-                  <a:cubicBezTo>
-                    <a:pt x="0" y="53"/>
-                    <a:pt x="15" y="68"/>
-                    <a:pt x="34" y="68"/>
-                  </a:cubicBezTo>
-                  <a:close/>
-                </a:path>
-              </a:pathLst>
-            </a:custGeom>
-            <a:solidFill>
-              <a:srgbClr val="C2C2C2"/>
-            </a:solidFill>
-            <a:ln>
-              <a:noFill/>
-            </a:ln>
-            <a:extLst>
-              <a:ext uri="{91240B29-F687-4F45-9708-019B960494DF}">
-                <a14:hiddenLine xmlns:a14="http://schemas.microsoft.com/office/drawing/2010/main" w="9525">
-                  <a:solidFill>
-                    <a:srgbClr val="000000"/>
-                  </a:solidFill>
-                  <a:round/>
-                  <a:headEnd/>
-                  <a:tailEnd/>
-                </a14:hiddenLine>
-              </a:ext>
-            </a:extLst>
-          </p:spPr>
-          <p:txBody>
-            <a:bodyPr vert="horz" wrap="square" lIns="122047" tIns="61024" rIns="122047" bIns="61024" numCol="1" anchor="t" anchorCtr="0" compatLnSpc="1">
-              <a:prstTxWarp prst="textNoShape">
-                <a:avLst/>
-              </a:prstTxWarp>
-            </a:bodyPr>
-            <a:lstStyle/>
-            <a:p>
-              <a:endParaRPr lang="en-US" sz="3206" dirty="0"/>
-            </a:p>
-          </p:txBody>
-        </p:sp>
-        <p:sp>
-          <p:nvSpPr>
-            <p:cNvPr id="101" name="Freeform 8">
-              <a:extLst>
-                <a:ext uri="{FF2B5EF4-FFF2-40B4-BE49-F238E27FC236}">
-                  <a16:creationId xmlns:a16="http://schemas.microsoft.com/office/drawing/2014/main" id="{E8BC34DF-18B0-4150-B436-D74163780F47}"/>
-                </a:ext>
-              </a:extLst>
-            </p:cNvPr>
-            <p:cNvSpPr>
-              <a:spLocks/>
-            </p:cNvSpPr>
-            <p:nvPr/>
-          </p:nvSpPr>
-          <p:spPr bwMode="auto">
-            <a:xfrm>
-              <a:off x="1892835" y="918213"/>
-              <a:ext cx="169863" cy="87313"/>
-            </a:xfrm>
-            <a:custGeom>
-              <a:avLst/>
-              <a:gdLst>
-                <a:gd name="T0" fmla="*/ 52 w 103"/>
-                <a:gd name="T1" fmla="*/ 0 h 52"/>
-                <a:gd name="T2" fmla="*/ 0 w 103"/>
-                <a:gd name="T3" fmla="*/ 52 h 52"/>
-                <a:gd name="T4" fmla="*/ 103 w 103"/>
-                <a:gd name="T5" fmla="*/ 52 h 52"/>
-                <a:gd name="T6" fmla="*/ 52 w 103"/>
-                <a:gd name="T7" fmla="*/ 0 h 52"/>
-              </a:gdLst>
-              <a:ahLst/>
-              <a:cxnLst>
-                <a:cxn ang="0">
-                  <a:pos x="T0" y="T1"/>
-                </a:cxn>
-                <a:cxn ang="0">
-                  <a:pos x="T2" y="T3"/>
-                </a:cxn>
-                <a:cxn ang="0">
-                  <a:pos x="T4" y="T5"/>
-                </a:cxn>
-                <a:cxn ang="0">
-                  <a:pos x="T6" y="T7"/>
-                </a:cxn>
-              </a:cxnLst>
-              <a:rect l="0" t="0" r="r" b="b"/>
-              <a:pathLst>
-                <a:path w="103" h="52">
-                  <a:moveTo>
-                    <a:pt x="52" y="0"/>
-                  </a:moveTo>
-                  <a:cubicBezTo>
-                    <a:pt x="23" y="0"/>
-                    <a:pt x="0" y="23"/>
-                    <a:pt x="0" y="52"/>
-                  </a:cubicBezTo>
-                  <a:cubicBezTo>
-                    <a:pt x="103" y="52"/>
-                    <a:pt x="103" y="52"/>
-                    <a:pt x="103" y="52"/>
-                  </a:cubicBezTo>
-                  <a:cubicBezTo>
-                    <a:pt x="103" y="23"/>
-                    <a:pt x="80" y="0"/>
-                    <a:pt x="52" y="0"/>
-                  </a:cubicBezTo>
-                  <a:close/>
-                </a:path>
-              </a:pathLst>
-            </a:custGeom>
-            <a:solidFill>
-              <a:srgbClr val="C2C2C2"/>
-            </a:solidFill>
-            <a:ln>
-              <a:noFill/>
-            </a:ln>
-            <a:extLst>
-              <a:ext uri="{91240B29-F687-4F45-9708-019B960494DF}">
-                <a14:hiddenLine xmlns:a14="http://schemas.microsoft.com/office/drawing/2010/main" w="9525">
-                  <a:solidFill>
-                    <a:srgbClr val="000000"/>
-                  </a:solidFill>
-                  <a:round/>
-                  <a:headEnd/>
-                  <a:tailEnd/>
-                </a14:hiddenLine>
-              </a:ext>
-            </a:extLst>
-          </p:spPr>
-          <p:txBody>
-            <a:bodyPr vert="horz" wrap="square" lIns="122047" tIns="61024" rIns="122047" bIns="61024" numCol="1" anchor="t" anchorCtr="0" compatLnSpc="1">
-              <a:prstTxWarp prst="textNoShape">
-                <a:avLst/>
-              </a:prstTxWarp>
-            </a:bodyPr>
-            <a:lstStyle/>
-            <a:p>
-              <a:endParaRPr lang="en-US" sz="3206" dirty="0"/>
-            </a:p>
-          </p:txBody>
-        </p:sp>
-        <p:sp>
-          <p:nvSpPr>
-            <p:cNvPr id="102" name="Freeform 9">
-              <a:extLst>
-                <a:ext uri="{FF2B5EF4-FFF2-40B4-BE49-F238E27FC236}">
-                  <a16:creationId xmlns:a16="http://schemas.microsoft.com/office/drawing/2014/main" id="{BD37E119-D516-4088-AABF-CEDF97438B60}"/>
-                </a:ext>
-              </a:extLst>
-            </p:cNvPr>
-            <p:cNvSpPr>
-              <a:spLocks/>
-            </p:cNvSpPr>
-            <p:nvPr/>
-          </p:nvSpPr>
-          <p:spPr bwMode="auto">
-            <a:xfrm>
-              <a:off x="2043647" y="876938"/>
-              <a:ext cx="55563" cy="57150"/>
-            </a:xfrm>
-            <a:custGeom>
-              <a:avLst/>
-              <a:gdLst>
-                <a:gd name="T0" fmla="*/ 27 w 35"/>
-                <a:gd name="T1" fmla="*/ 15 h 36"/>
-                <a:gd name="T2" fmla="*/ 6 w 35"/>
-                <a:gd name="T3" fmla="*/ 36 h 36"/>
-                <a:gd name="T4" fmla="*/ 0 w 35"/>
-                <a:gd name="T5" fmla="*/ 30 h 36"/>
-                <a:gd name="T6" fmla="*/ 20 w 35"/>
-                <a:gd name="T7" fmla="*/ 9 h 36"/>
-                <a:gd name="T8" fmla="*/ 6 w 35"/>
-                <a:gd name="T9" fmla="*/ 9 h 36"/>
-                <a:gd name="T10" fmla="*/ 6 w 35"/>
-                <a:gd name="T11" fmla="*/ 0 h 36"/>
-                <a:gd name="T12" fmla="*/ 35 w 35"/>
-                <a:gd name="T13" fmla="*/ 0 h 36"/>
-                <a:gd name="T14" fmla="*/ 35 w 35"/>
-                <a:gd name="T15" fmla="*/ 30 h 36"/>
-                <a:gd name="T16" fmla="*/ 27 w 35"/>
-                <a:gd name="T17" fmla="*/ 30 h 36"/>
-                <a:gd name="T18" fmla="*/ 27 w 35"/>
-                <a:gd name="T19" fmla="*/ 15 h 36"/>
-              </a:gdLst>
-              <a:ahLst/>
-              <a:cxnLst>
-                <a:cxn ang="0">
-                  <a:pos x="T0" y="T1"/>
-                </a:cxn>
-                <a:cxn ang="0">
-                  <a:pos x="T2" y="T3"/>
-                </a:cxn>
-                <a:cxn ang="0">
-                  <a:pos x="T4" y="T5"/>
-                </a:cxn>
-                <a:cxn ang="0">
-                  <a:pos x="T6" y="T7"/>
-                </a:cxn>
-                <a:cxn ang="0">
-                  <a:pos x="T8" y="T9"/>
-                </a:cxn>
-                <a:cxn ang="0">
-                  <a:pos x="T10" y="T11"/>
-                </a:cxn>
-                <a:cxn ang="0">
-                  <a:pos x="T12" y="T13"/>
-                </a:cxn>
-                <a:cxn ang="0">
-                  <a:pos x="T14" y="T15"/>
-                </a:cxn>
-                <a:cxn ang="0">
-                  <a:pos x="T16" y="T17"/>
-                </a:cxn>
-                <a:cxn ang="0">
-                  <a:pos x="T18" y="T19"/>
-                </a:cxn>
-              </a:cxnLst>
-              <a:rect l="0" t="0" r="r" b="b"/>
-              <a:pathLst>
-                <a:path w="35" h="36">
-                  <a:moveTo>
-                    <a:pt x="27" y="15"/>
-                  </a:moveTo>
-                  <a:lnTo>
-                    <a:pt x="6" y="36"/>
-                  </a:lnTo>
-                  <a:lnTo>
-                    <a:pt x="0" y="30"/>
-                  </a:lnTo>
-                  <a:lnTo>
-                    <a:pt x="20" y="9"/>
-                  </a:lnTo>
-                  <a:lnTo>
-                    <a:pt x="6" y="9"/>
-                  </a:lnTo>
-                  <a:lnTo>
-                    <a:pt x="6" y="0"/>
-                  </a:lnTo>
-                  <a:lnTo>
-                    <a:pt x="35" y="0"/>
-                  </a:lnTo>
-                  <a:lnTo>
-                    <a:pt x="35" y="30"/>
-                  </a:lnTo>
-                  <a:lnTo>
-                    <a:pt x="27" y="30"/>
-                  </a:lnTo>
-                  <a:lnTo>
-                    <a:pt x="27" y="15"/>
-                  </a:lnTo>
-                  <a:close/>
-                </a:path>
-              </a:pathLst>
-            </a:custGeom>
-            <a:solidFill>
-              <a:srgbClr val="D83B01"/>
-            </a:solidFill>
-            <a:ln>
-              <a:noFill/>
-            </a:ln>
-            <a:extLst>
-              <a:ext uri="{91240B29-F687-4F45-9708-019B960494DF}">
-                <a14:hiddenLine xmlns:a14="http://schemas.microsoft.com/office/drawing/2010/main" w="9525">
-                  <a:solidFill>
-                    <a:srgbClr val="000000"/>
-                  </a:solidFill>
-                  <a:round/>
-                  <a:headEnd/>
-                  <a:tailEnd/>
-                </a14:hiddenLine>
-              </a:ext>
-            </a:extLst>
-          </p:spPr>
-          <p:txBody>
-            <a:bodyPr vert="horz" wrap="square" lIns="122047" tIns="61024" rIns="122047" bIns="61024" numCol="1" anchor="t" anchorCtr="0" compatLnSpc="1">
-              <a:prstTxWarp prst="textNoShape">
-                <a:avLst/>
-              </a:prstTxWarp>
-            </a:bodyPr>
-            <a:lstStyle/>
-            <a:p>
-              <a:endParaRPr lang="en-US" sz="3206" dirty="0"/>
-            </a:p>
-          </p:txBody>
-        </p:sp>
-      </p:grpSp>
       <p:sp>
         <p:nvSpPr>
           <p:cNvPr id="103" name="TextBox 102">
@@ -18842,158 +17643,6 @@
           </a:p>
         </p:txBody>
       </p:sp>
-      <p:grpSp>
-        <p:nvGrpSpPr>
-          <p:cNvPr id="3" name="Group 2">
-            <a:extLst>
-              <a:ext uri="{FF2B5EF4-FFF2-40B4-BE49-F238E27FC236}">
-                <a16:creationId xmlns:a16="http://schemas.microsoft.com/office/drawing/2014/main" id="{37CBFEEC-6593-4916-B421-442DF26E66B3}"/>
-              </a:ext>
-            </a:extLst>
-          </p:cNvPr>
-          <p:cNvGrpSpPr/>
-          <p:nvPr/>
-        </p:nvGrpSpPr>
-        <p:grpSpPr>
-          <a:xfrm>
-            <a:off x="6905648" y="3540040"/>
-            <a:ext cx="819007" cy="1021245"/>
-            <a:chOff x="6817210" y="9000801"/>
-            <a:chExt cx="819007" cy="1021245"/>
-          </a:xfrm>
-        </p:grpSpPr>
-        <p:sp>
-          <p:nvSpPr>
-            <p:cNvPr id="144" name="TextBox 143">
-              <a:extLst>
-                <a:ext uri="{FF2B5EF4-FFF2-40B4-BE49-F238E27FC236}">
-                  <a16:creationId xmlns:a16="http://schemas.microsoft.com/office/drawing/2014/main" id="{71DC5388-C46D-438B-A501-77575DD09EE7}"/>
-                </a:ext>
-              </a:extLst>
-            </p:cNvPr>
-            <p:cNvSpPr txBox="1"/>
-            <p:nvPr/>
-          </p:nvSpPr>
-          <p:spPr>
-            <a:xfrm>
-              <a:off x="6817210" y="9745047"/>
-              <a:ext cx="819007" cy="276999"/>
-            </a:xfrm>
-            <a:prstGeom prst="rect">
-              <a:avLst/>
-            </a:prstGeom>
-            <a:noFill/>
-          </p:spPr>
-          <p:txBody>
-            <a:bodyPr wrap="none" rtlCol="0">
-              <a:spAutoFit/>
-            </a:bodyPr>
-            <a:lstStyle/>
-            <a:p>
-              <a:pPr algn="ctr"/>
-              <a:r>
-                <a:rPr lang="en-US" sz="1200" dirty="0">
-                  <a:latin typeface="Segoe UI" panose="020B0502040204020203" pitchFamily="34" charset="0"/>
-                  <a:cs typeface="Segoe UI" panose="020B0502040204020203" pitchFamily="34" charset="0"/>
-                </a:rPr>
-                <a:t>Azure AD</a:t>
-              </a:r>
-              <a:endParaRPr lang="en-US" sz="1050" dirty="0">
-                <a:latin typeface="Segoe UI" panose="020B0502040204020203" pitchFamily="34" charset="0"/>
-                <a:cs typeface="Segoe UI" panose="020B0502040204020203" pitchFamily="34" charset="0"/>
-              </a:endParaRPr>
-            </a:p>
-          </p:txBody>
-        </p:sp>
-        <p:sp>
-          <p:nvSpPr>
-            <p:cNvPr id="164" name="Rectangle 163">
-              <a:extLst>
-                <a:ext uri="{FF2B5EF4-FFF2-40B4-BE49-F238E27FC236}">
-                  <a16:creationId xmlns:a16="http://schemas.microsoft.com/office/drawing/2014/main" id="{88AB80F3-7743-4428-94C8-64EB5A7A3781}"/>
-                </a:ext>
-              </a:extLst>
-            </p:cNvPr>
-            <p:cNvSpPr/>
-            <p:nvPr/>
-          </p:nvSpPr>
-          <p:spPr>
-            <a:xfrm rot="18711775">
-              <a:off x="7003380" y="9197257"/>
-              <a:ext cx="449580" cy="445608"/>
-            </a:xfrm>
-            <a:prstGeom prst="rect">
-              <a:avLst/>
-            </a:prstGeom>
-            <a:solidFill>
-              <a:schemeClr val="bg1"/>
-            </a:solidFill>
-            <a:ln>
-              <a:noFill/>
-            </a:ln>
-          </p:spPr>
-          <p:style>
-            <a:lnRef idx="2">
-              <a:schemeClr val="accent1">
-                <a:shade val="50000"/>
-              </a:schemeClr>
-            </a:lnRef>
-            <a:fillRef idx="1">
-              <a:schemeClr val="accent1"/>
-            </a:fillRef>
-            <a:effectRef idx="0">
-              <a:schemeClr val="accent1"/>
-            </a:effectRef>
-            <a:fontRef idx="minor">
-              <a:schemeClr val="lt1"/>
-            </a:fontRef>
-          </p:style>
-          <p:txBody>
-            <a:bodyPr rtlCol="0" anchor="ctr"/>
-            <a:lstStyle/>
-            <a:p>
-              <a:pPr algn="ctr"/>
-              <a:endParaRPr lang="en-US" dirty="0"/>
-            </a:p>
-          </p:txBody>
-        </p:sp>
-        <p:pic>
-          <p:nvPicPr>
-            <p:cNvPr id="165" name="Picture 164">
-              <a:extLst>
-                <a:ext uri="{FF2B5EF4-FFF2-40B4-BE49-F238E27FC236}">
-                  <a16:creationId xmlns:a16="http://schemas.microsoft.com/office/drawing/2014/main" id="{C694C8F2-0469-49F1-9B20-F9D7C494F781}"/>
-                </a:ext>
-              </a:extLst>
-            </p:cNvPr>
-            <p:cNvPicPr>
-              <a:picLocks noChangeAspect="1"/>
-            </p:cNvPicPr>
-            <p:nvPr/>
-          </p:nvPicPr>
-          <p:blipFill>
-            <a:blip r:embed="rId3">
-              <a:extLst>
-                <a:ext uri="{28A0092B-C50C-407E-A947-70E740481C1C}">
-                  <a14:useLocalDpi xmlns:a14="http://schemas.microsoft.com/office/drawing/2010/main" val="0"/>
-                </a:ext>
-              </a:extLst>
-            </a:blip>
-            <a:stretch>
-              <a:fillRect/>
-            </a:stretch>
-          </p:blipFill>
-          <p:spPr>
-            <a:xfrm>
-              <a:off x="6848296" y="9000801"/>
-              <a:ext cx="780290" cy="780290"/>
-            </a:xfrm>
-            <a:prstGeom prst="rect">
-              <a:avLst/>
-            </a:prstGeom>
-          </p:spPr>
-        </p:pic>
-      </p:grpSp>
       <p:sp>
         <p:nvSpPr>
           <p:cNvPr id="169" name="TextBox 168">
@@ -19670,158 +18319,6 @@
             </a:p>
           </p:txBody>
         </p:sp>
-      </p:grpSp>
-      <p:grpSp>
-        <p:nvGrpSpPr>
-          <p:cNvPr id="227" name="Group 226">
-            <a:extLst>
-              <a:ext uri="{FF2B5EF4-FFF2-40B4-BE49-F238E27FC236}">
-                <a16:creationId xmlns:a16="http://schemas.microsoft.com/office/drawing/2014/main" id="{43A27AD4-C64C-459C-821C-DF06C0BD2454}"/>
-              </a:ext>
-            </a:extLst>
-          </p:cNvPr>
-          <p:cNvGrpSpPr/>
-          <p:nvPr/>
-        </p:nvGrpSpPr>
-        <p:grpSpPr>
-          <a:xfrm>
-            <a:off x="6904033" y="6758577"/>
-            <a:ext cx="819007" cy="1021245"/>
-            <a:chOff x="6817210" y="9000801"/>
-            <a:chExt cx="819007" cy="1021245"/>
-          </a:xfrm>
-        </p:grpSpPr>
-        <p:sp>
-          <p:nvSpPr>
-            <p:cNvPr id="228" name="TextBox 227">
-              <a:extLst>
-                <a:ext uri="{FF2B5EF4-FFF2-40B4-BE49-F238E27FC236}">
-                  <a16:creationId xmlns:a16="http://schemas.microsoft.com/office/drawing/2014/main" id="{0E1362F7-BB68-4E9D-8C58-3752E818A8EA}"/>
-                </a:ext>
-              </a:extLst>
-            </p:cNvPr>
-            <p:cNvSpPr txBox="1"/>
-            <p:nvPr/>
-          </p:nvSpPr>
-          <p:spPr>
-            <a:xfrm>
-              <a:off x="6817210" y="9745047"/>
-              <a:ext cx="819007" cy="276999"/>
-            </a:xfrm>
-            <a:prstGeom prst="rect">
-              <a:avLst/>
-            </a:prstGeom>
-            <a:noFill/>
-          </p:spPr>
-          <p:txBody>
-            <a:bodyPr wrap="none" rtlCol="0">
-              <a:spAutoFit/>
-            </a:bodyPr>
-            <a:lstStyle/>
-            <a:p>
-              <a:pPr algn="ctr"/>
-              <a:r>
-                <a:rPr lang="en-US" sz="1200" dirty="0">
-                  <a:latin typeface="Segoe UI" panose="020B0502040204020203" pitchFamily="34" charset="0"/>
-                  <a:cs typeface="Segoe UI" panose="020B0502040204020203" pitchFamily="34" charset="0"/>
-                </a:rPr>
-                <a:t>Azure AD</a:t>
-              </a:r>
-              <a:endParaRPr lang="en-US" sz="1050" dirty="0">
-                <a:latin typeface="Segoe UI" panose="020B0502040204020203" pitchFamily="34" charset="0"/>
-                <a:cs typeface="Segoe UI" panose="020B0502040204020203" pitchFamily="34" charset="0"/>
-              </a:endParaRPr>
-            </a:p>
-          </p:txBody>
-        </p:sp>
-        <p:sp>
-          <p:nvSpPr>
-            <p:cNvPr id="229" name="Rectangle 228">
-              <a:extLst>
-                <a:ext uri="{FF2B5EF4-FFF2-40B4-BE49-F238E27FC236}">
-                  <a16:creationId xmlns:a16="http://schemas.microsoft.com/office/drawing/2014/main" id="{8EF9B267-2537-44D7-B4C8-108884E980AD}"/>
-                </a:ext>
-              </a:extLst>
-            </p:cNvPr>
-            <p:cNvSpPr/>
-            <p:nvPr/>
-          </p:nvSpPr>
-          <p:spPr>
-            <a:xfrm rot="18711775">
-              <a:off x="7003380" y="9197257"/>
-              <a:ext cx="449580" cy="445608"/>
-            </a:xfrm>
-            <a:prstGeom prst="rect">
-              <a:avLst/>
-            </a:prstGeom>
-            <a:solidFill>
-              <a:schemeClr val="bg1"/>
-            </a:solidFill>
-            <a:ln>
-              <a:noFill/>
-            </a:ln>
-          </p:spPr>
-          <p:style>
-            <a:lnRef idx="2">
-              <a:schemeClr val="accent1">
-                <a:shade val="50000"/>
-              </a:schemeClr>
-            </a:lnRef>
-            <a:fillRef idx="1">
-              <a:schemeClr val="accent1"/>
-            </a:fillRef>
-            <a:effectRef idx="0">
-              <a:schemeClr val="accent1"/>
-            </a:effectRef>
-            <a:fontRef idx="minor">
-              <a:schemeClr val="lt1"/>
-            </a:fontRef>
-          </p:style>
-          <p:txBody>
-            <a:bodyPr rtlCol="0" anchor="ctr"/>
-            <a:lstStyle/>
-            <a:p>
-              <a:pPr algn="ctr"/>
-              <a:endParaRPr lang="en-US" dirty="0"/>
-            </a:p>
-          </p:txBody>
-        </p:sp>
-        <p:pic>
-          <p:nvPicPr>
-            <p:cNvPr id="230" name="Picture 229">
-              <a:extLst>
-                <a:ext uri="{FF2B5EF4-FFF2-40B4-BE49-F238E27FC236}">
-                  <a16:creationId xmlns:a16="http://schemas.microsoft.com/office/drawing/2014/main" id="{FA90AC6D-CCEE-4485-BC29-3E5ADA2F9D37}"/>
-                </a:ext>
-              </a:extLst>
-            </p:cNvPr>
-            <p:cNvPicPr>
-              <a:picLocks noChangeAspect="1"/>
-            </p:cNvPicPr>
-            <p:nvPr/>
-          </p:nvPicPr>
-          <p:blipFill>
-            <a:blip r:embed="rId3">
-              <a:extLst>
-                <a:ext uri="{28A0092B-C50C-407E-A947-70E740481C1C}">
-                  <a14:useLocalDpi xmlns:a14="http://schemas.microsoft.com/office/drawing/2010/main" val="0"/>
-                </a:ext>
-              </a:extLst>
-            </a:blip>
-            <a:stretch>
-              <a:fillRect/>
-            </a:stretch>
-          </p:blipFill>
-          <p:spPr>
-            <a:xfrm>
-              <a:off x="6848296" y="9000801"/>
-              <a:ext cx="780290" cy="780290"/>
-            </a:xfrm>
-            <a:prstGeom prst="rect">
-              <a:avLst/>
-            </a:prstGeom>
-          </p:spPr>
-        </p:pic>
       </p:grpSp>
       <p:grpSp>
         <p:nvGrpSpPr>
@@ -22814,158 +21311,6 @@
       </p:grpSp>
       <p:grpSp>
         <p:nvGrpSpPr>
-          <p:cNvPr id="287" name="Group 286">
-            <a:extLst>
-              <a:ext uri="{FF2B5EF4-FFF2-40B4-BE49-F238E27FC236}">
-                <a16:creationId xmlns:a16="http://schemas.microsoft.com/office/drawing/2014/main" id="{68544E94-79C6-4A8A-B3A6-A7EE52384FAC}"/>
-              </a:ext>
-            </a:extLst>
-          </p:cNvPr>
-          <p:cNvGrpSpPr/>
-          <p:nvPr/>
-        </p:nvGrpSpPr>
-        <p:grpSpPr>
-          <a:xfrm>
-            <a:off x="6904033" y="10142177"/>
-            <a:ext cx="819007" cy="1021245"/>
-            <a:chOff x="6817210" y="9000801"/>
-            <a:chExt cx="819007" cy="1021245"/>
-          </a:xfrm>
-        </p:grpSpPr>
-        <p:sp>
-          <p:nvSpPr>
-            <p:cNvPr id="288" name="TextBox 287">
-              <a:extLst>
-                <a:ext uri="{FF2B5EF4-FFF2-40B4-BE49-F238E27FC236}">
-                  <a16:creationId xmlns:a16="http://schemas.microsoft.com/office/drawing/2014/main" id="{C512C6AA-E565-4518-A61B-674ECAF3648D}"/>
-                </a:ext>
-              </a:extLst>
-            </p:cNvPr>
-            <p:cNvSpPr txBox="1"/>
-            <p:nvPr/>
-          </p:nvSpPr>
-          <p:spPr>
-            <a:xfrm>
-              <a:off x="6817210" y="9745047"/>
-              <a:ext cx="819007" cy="276999"/>
-            </a:xfrm>
-            <a:prstGeom prst="rect">
-              <a:avLst/>
-            </a:prstGeom>
-            <a:noFill/>
-          </p:spPr>
-          <p:txBody>
-            <a:bodyPr wrap="none" rtlCol="0">
-              <a:spAutoFit/>
-            </a:bodyPr>
-            <a:lstStyle/>
-            <a:p>
-              <a:pPr algn="ctr"/>
-              <a:r>
-                <a:rPr lang="en-US" sz="1200" dirty="0">
-                  <a:latin typeface="Segoe UI" panose="020B0502040204020203" pitchFamily="34" charset="0"/>
-                  <a:cs typeface="Segoe UI" panose="020B0502040204020203" pitchFamily="34" charset="0"/>
-                </a:rPr>
-                <a:t>Azure AD</a:t>
-              </a:r>
-              <a:endParaRPr lang="en-US" sz="1050" dirty="0">
-                <a:latin typeface="Segoe UI" panose="020B0502040204020203" pitchFamily="34" charset="0"/>
-                <a:cs typeface="Segoe UI" panose="020B0502040204020203" pitchFamily="34" charset="0"/>
-              </a:endParaRPr>
-            </a:p>
-          </p:txBody>
-        </p:sp>
-        <p:sp>
-          <p:nvSpPr>
-            <p:cNvPr id="289" name="Rectangle 288">
-              <a:extLst>
-                <a:ext uri="{FF2B5EF4-FFF2-40B4-BE49-F238E27FC236}">
-                  <a16:creationId xmlns:a16="http://schemas.microsoft.com/office/drawing/2014/main" id="{EAAE9064-3974-4FCF-916F-A849F0314E41}"/>
-                </a:ext>
-              </a:extLst>
-            </p:cNvPr>
-            <p:cNvSpPr/>
-            <p:nvPr/>
-          </p:nvSpPr>
-          <p:spPr>
-            <a:xfrm rot="18711775">
-              <a:off x="7003380" y="9197257"/>
-              <a:ext cx="449580" cy="445608"/>
-            </a:xfrm>
-            <a:prstGeom prst="rect">
-              <a:avLst/>
-            </a:prstGeom>
-            <a:solidFill>
-              <a:schemeClr val="bg1"/>
-            </a:solidFill>
-            <a:ln>
-              <a:noFill/>
-            </a:ln>
-          </p:spPr>
-          <p:style>
-            <a:lnRef idx="2">
-              <a:schemeClr val="accent1">
-                <a:shade val="50000"/>
-              </a:schemeClr>
-            </a:lnRef>
-            <a:fillRef idx="1">
-              <a:schemeClr val="accent1"/>
-            </a:fillRef>
-            <a:effectRef idx="0">
-              <a:schemeClr val="accent1"/>
-            </a:effectRef>
-            <a:fontRef idx="minor">
-              <a:schemeClr val="lt1"/>
-            </a:fontRef>
-          </p:style>
-          <p:txBody>
-            <a:bodyPr rtlCol="0" anchor="ctr"/>
-            <a:lstStyle/>
-            <a:p>
-              <a:pPr algn="ctr"/>
-              <a:endParaRPr lang="en-US" dirty="0"/>
-            </a:p>
-          </p:txBody>
-        </p:sp>
-        <p:pic>
-          <p:nvPicPr>
-            <p:cNvPr id="290" name="Picture 289">
-              <a:extLst>
-                <a:ext uri="{FF2B5EF4-FFF2-40B4-BE49-F238E27FC236}">
-                  <a16:creationId xmlns:a16="http://schemas.microsoft.com/office/drawing/2014/main" id="{7FA88BF1-97A1-4ADB-BD49-33212107CC53}"/>
-                </a:ext>
-              </a:extLst>
-            </p:cNvPr>
-            <p:cNvPicPr>
-              <a:picLocks noChangeAspect="1"/>
-            </p:cNvPicPr>
-            <p:nvPr/>
-          </p:nvPicPr>
-          <p:blipFill>
-            <a:blip r:embed="rId3">
-              <a:extLst>
-                <a:ext uri="{28A0092B-C50C-407E-A947-70E740481C1C}">
-                  <a14:useLocalDpi xmlns:a14="http://schemas.microsoft.com/office/drawing/2010/main" val="0"/>
-                </a:ext>
-              </a:extLst>
-            </a:blip>
-            <a:stretch>
-              <a:fillRect/>
-            </a:stretch>
-          </p:blipFill>
-          <p:spPr>
-            <a:xfrm>
-              <a:off x="6848296" y="9000801"/>
-              <a:ext cx="780290" cy="780290"/>
-            </a:xfrm>
-            <a:prstGeom prst="rect">
-              <a:avLst/>
-            </a:prstGeom>
-          </p:spPr>
-        </p:pic>
-      </p:grpSp>
-      <p:grpSp>
-        <p:nvGrpSpPr>
           <p:cNvPr id="291" name="Group 290">
             <a:extLst>
               <a:ext uri="{FF2B5EF4-FFF2-40B4-BE49-F238E27FC236}">
@@ -25207,13 +23552,13 @@
           <p:nvPr/>
         </p:nvPicPr>
         <p:blipFill>
-          <a:blip r:embed="rId4">
+          <a:blip r:embed="rId3">
             <a:extLst>
               <a:ext uri="{28A0092B-C50C-407E-A947-70E740481C1C}">
                 <a14:useLocalDpi xmlns:a14="http://schemas.microsoft.com/office/drawing/2010/main" val="0"/>
               </a:ext>
               <a:ext uri="{96DAC541-7B7A-43D3-8B79-37D633B846F1}">
-                <asvg:svgBlip xmlns:asvg="http://schemas.microsoft.com/office/drawing/2016/SVG/main" r:embed="rId5"/>
+                <asvg:svgBlip xmlns:asvg="http://schemas.microsoft.com/office/drawing/2016/SVG/main" r:embed="rId4"/>
               </a:ext>
             </a:extLst>
           </a:blip>
@@ -25953,158 +24298,6 @@
       </p:grpSp>
       <p:grpSp>
         <p:nvGrpSpPr>
-          <p:cNvPr id="340" name="Group 339">
-            <a:extLst>
-              <a:ext uri="{FF2B5EF4-FFF2-40B4-BE49-F238E27FC236}">
-                <a16:creationId xmlns:a16="http://schemas.microsoft.com/office/drawing/2014/main" id="{21CA0787-86CB-47D8-B7B8-43A2EBAC2DBA}"/>
-              </a:ext>
-            </a:extLst>
-          </p:cNvPr>
-          <p:cNvGrpSpPr/>
-          <p:nvPr/>
-        </p:nvGrpSpPr>
-        <p:grpSpPr>
-          <a:xfrm>
-            <a:off x="6921393" y="13517663"/>
-            <a:ext cx="819007" cy="1021245"/>
-            <a:chOff x="6817210" y="9000801"/>
-            <a:chExt cx="819007" cy="1021245"/>
-          </a:xfrm>
-        </p:grpSpPr>
-        <p:sp>
-          <p:nvSpPr>
-            <p:cNvPr id="341" name="TextBox 340">
-              <a:extLst>
-                <a:ext uri="{FF2B5EF4-FFF2-40B4-BE49-F238E27FC236}">
-                  <a16:creationId xmlns:a16="http://schemas.microsoft.com/office/drawing/2014/main" id="{59811CA9-33E9-431B-B321-FB4F3212FFEE}"/>
-                </a:ext>
-              </a:extLst>
-            </p:cNvPr>
-            <p:cNvSpPr txBox="1"/>
-            <p:nvPr/>
-          </p:nvSpPr>
-          <p:spPr>
-            <a:xfrm>
-              <a:off x="6817210" y="9745047"/>
-              <a:ext cx="819007" cy="276999"/>
-            </a:xfrm>
-            <a:prstGeom prst="rect">
-              <a:avLst/>
-            </a:prstGeom>
-            <a:noFill/>
-          </p:spPr>
-          <p:txBody>
-            <a:bodyPr wrap="none" rtlCol="0">
-              <a:spAutoFit/>
-            </a:bodyPr>
-            <a:lstStyle/>
-            <a:p>
-              <a:pPr algn="ctr"/>
-              <a:r>
-                <a:rPr lang="en-US" sz="1200" dirty="0">
-                  <a:latin typeface="Segoe UI" panose="020B0502040204020203" pitchFamily="34" charset="0"/>
-                  <a:cs typeface="Segoe UI" panose="020B0502040204020203" pitchFamily="34" charset="0"/>
-                </a:rPr>
-                <a:t>Azure AD</a:t>
-              </a:r>
-              <a:endParaRPr lang="en-US" sz="1050" dirty="0">
-                <a:latin typeface="Segoe UI" panose="020B0502040204020203" pitchFamily="34" charset="0"/>
-                <a:cs typeface="Segoe UI" panose="020B0502040204020203" pitchFamily="34" charset="0"/>
-              </a:endParaRPr>
-            </a:p>
-          </p:txBody>
-        </p:sp>
-        <p:sp>
-          <p:nvSpPr>
-            <p:cNvPr id="342" name="Rectangle 341">
-              <a:extLst>
-                <a:ext uri="{FF2B5EF4-FFF2-40B4-BE49-F238E27FC236}">
-                  <a16:creationId xmlns:a16="http://schemas.microsoft.com/office/drawing/2014/main" id="{147A4063-93D9-460E-9563-1A97D642D559}"/>
-                </a:ext>
-              </a:extLst>
-            </p:cNvPr>
-            <p:cNvSpPr/>
-            <p:nvPr/>
-          </p:nvSpPr>
-          <p:spPr>
-            <a:xfrm rot="18711775">
-              <a:off x="7003380" y="9197257"/>
-              <a:ext cx="449580" cy="445608"/>
-            </a:xfrm>
-            <a:prstGeom prst="rect">
-              <a:avLst/>
-            </a:prstGeom>
-            <a:solidFill>
-              <a:schemeClr val="bg1"/>
-            </a:solidFill>
-            <a:ln>
-              <a:noFill/>
-            </a:ln>
-          </p:spPr>
-          <p:style>
-            <a:lnRef idx="2">
-              <a:schemeClr val="accent1">
-                <a:shade val="50000"/>
-              </a:schemeClr>
-            </a:lnRef>
-            <a:fillRef idx="1">
-              <a:schemeClr val="accent1"/>
-            </a:fillRef>
-            <a:effectRef idx="0">
-              <a:schemeClr val="accent1"/>
-            </a:effectRef>
-            <a:fontRef idx="minor">
-              <a:schemeClr val="lt1"/>
-            </a:fontRef>
-          </p:style>
-          <p:txBody>
-            <a:bodyPr rtlCol="0" anchor="ctr"/>
-            <a:lstStyle/>
-            <a:p>
-              <a:pPr algn="ctr"/>
-              <a:endParaRPr lang="en-US" dirty="0"/>
-            </a:p>
-          </p:txBody>
-        </p:sp>
-        <p:pic>
-          <p:nvPicPr>
-            <p:cNvPr id="343" name="Picture 342">
-              <a:extLst>
-                <a:ext uri="{FF2B5EF4-FFF2-40B4-BE49-F238E27FC236}">
-                  <a16:creationId xmlns:a16="http://schemas.microsoft.com/office/drawing/2014/main" id="{5EDA7F82-34F1-4EB0-9B3F-5B03A9A556EE}"/>
-                </a:ext>
-              </a:extLst>
-            </p:cNvPr>
-            <p:cNvPicPr>
-              <a:picLocks noChangeAspect="1"/>
-            </p:cNvPicPr>
-            <p:nvPr/>
-          </p:nvPicPr>
-          <p:blipFill>
-            <a:blip r:embed="rId3">
-              <a:extLst>
-                <a:ext uri="{28A0092B-C50C-407E-A947-70E740481C1C}">
-                  <a14:useLocalDpi xmlns:a14="http://schemas.microsoft.com/office/drawing/2010/main" val="0"/>
-                </a:ext>
-              </a:extLst>
-            </a:blip>
-            <a:stretch>
-              <a:fillRect/>
-            </a:stretch>
-          </p:blipFill>
-          <p:spPr>
-            <a:xfrm>
-              <a:off x="6848296" y="9000801"/>
-              <a:ext cx="780290" cy="780290"/>
-            </a:xfrm>
-            <a:prstGeom prst="rect">
-              <a:avLst/>
-            </a:prstGeom>
-          </p:spPr>
-        </p:pic>
-      </p:grpSp>
-      <p:grpSp>
-        <p:nvGrpSpPr>
           <p:cNvPr id="344" name="Group 343">
             <a:extLst>
               <a:ext uri="{FF2B5EF4-FFF2-40B4-BE49-F238E27FC236}">
@@ -28564,47 +26757,6 @@
           </a:p>
         </p:txBody>
       </p:sp>
-      <p:sp>
-        <p:nvSpPr>
-          <p:cNvPr id="177" name="TextBox 176">
-            <a:extLst>
-              <a:ext uri="{FF2B5EF4-FFF2-40B4-BE49-F238E27FC236}">
-                <a16:creationId xmlns:a16="http://schemas.microsoft.com/office/drawing/2014/main" id="{C0ED99DB-317E-41B9-9A9D-DACC0A6D7A5D}"/>
-              </a:ext>
-            </a:extLst>
-          </p:cNvPr>
-          <p:cNvSpPr txBox="1"/>
-          <p:nvPr/>
-        </p:nvSpPr>
-        <p:spPr>
-          <a:xfrm>
-            <a:off x="6172200" y="15002223"/>
-            <a:ext cx="3568156" cy="276999"/>
-          </a:xfrm>
-          <a:prstGeom prst="rect">
-            <a:avLst/>
-          </a:prstGeom>
-          <a:noFill/>
-        </p:spPr>
-        <p:txBody>
-          <a:bodyPr wrap="none" rtlCol="0">
-            <a:spAutoFit/>
-          </a:bodyPr>
-          <a:lstStyle/>
-          <a:p>
-            <a:r>
-              <a:rPr lang="en-US" sz="1200" b="0" i="0" u="none" strike="noStrike" baseline="0" dirty="0">
-                <a:solidFill>
-                  <a:srgbClr val="7F7F7F"/>
-                </a:solidFill>
-                <a:latin typeface="Segoe UI" panose="020B0502040204020203" pitchFamily="34" charset="0"/>
-              </a:rPr>
-              <a:t>© 2019 Microsoft Corporation. All rights reserved.</a:t>
-            </a:r>
-            <a:endParaRPr lang="en-US" sz="1200" dirty="0"/>
-          </a:p>
-        </p:txBody>
-      </p:sp>
       <p:pic>
         <p:nvPicPr>
           <p:cNvPr id="167" name="Graphic 166">
@@ -28620,13 +26772,13 @@
           <p:nvPr/>
         </p:nvPicPr>
         <p:blipFill>
-          <a:blip r:embed="rId6">
+          <a:blip r:embed="rId5">
             <a:extLst>
               <a:ext uri="{28A0092B-C50C-407E-A947-70E740481C1C}">
                 <a14:useLocalDpi xmlns:a14="http://schemas.microsoft.com/office/drawing/2010/main" val="0"/>
               </a:ext>
               <a:ext uri="{96DAC541-7B7A-43D3-8B79-37D633B846F1}">
-                <asvg:svgBlip xmlns:asvg="http://schemas.microsoft.com/office/drawing/2016/SVG/main" r:embed="rId7"/>
+                <asvg:svgBlip xmlns:asvg="http://schemas.microsoft.com/office/drawing/2016/SVG/main" r:embed="rId6"/>
               </a:ext>
             </a:extLst>
           </a:blip>
@@ -28647,7 +26799,7 @@
       <p:sp>
         <p:nvSpPr>
           <p:cNvPr id="176" name="Text Placeholder 3">
-            <a:hlinkClick r:id="rId8"/>
+            <a:hlinkClick r:id="rId7"/>
             <a:extLst>
               <a:ext uri="{FF2B5EF4-FFF2-40B4-BE49-F238E27FC236}">
                 <a16:creationId xmlns:a16="http://schemas.microsoft.com/office/drawing/2014/main" id="{6121BEE9-83A0-4636-BF71-6459E703AC9D}"/>
@@ -28784,7 +26936,7 @@
       <p:pic>
         <p:nvPicPr>
           <p:cNvPr id="178" name="Picture 177">
-            <a:hlinkClick r:id="rId8"/>
+            <a:hlinkClick r:id="rId7"/>
             <a:extLst>
               <a:ext uri="{FF2B5EF4-FFF2-40B4-BE49-F238E27FC236}">
                 <a16:creationId xmlns:a16="http://schemas.microsoft.com/office/drawing/2014/main" id="{BDCB01FE-DB11-4749-B632-01F46C2C097B}"/>
@@ -28797,7 +26949,7 @@
           <p:nvPr/>
         </p:nvPicPr>
         <p:blipFill>
-          <a:blip r:embed="rId9"/>
+          <a:blip r:embed="rId8"/>
           <a:stretch>
             <a:fillRect/>
           </a:stretch>
@@ -31524,7 +29676,7 @@
       <p:sp>
         <p:nvSpPr>
           <p:cNvPr id="7" name="Rectangle 6">
-            <a:hlinkClick r:id="rId10"/>
+            <a:hlinkClick r:id="rId9"/>
             <a:extLst>
               <a:ext uri="{FF2B5EF4-FFF2-40B4-BE49-F238E27FC236}">
                 <a16:creationId xmlns:a16="http://schemas.microsoft.com/office/drawing/2014/main" id="{BF56C149-E0DD-46AA-A68E-0D3D4A17EDFD}"/>
@@ -31632,7 +29784,7 @@
           <p:nvPr/>
         </p:nvPicPr>
         <p:blipFill>
-          <a:blip r:embed="rId11"/>
+          <a:blip r:embed="rId10"/>
           <a:stretch>
             <a:fillRect/>
           </a:stretch>
@@ -31647,6 +29799,802 @@
           </a:prstGeom>
         </p:spPr>
       </p:pic>
+      <p:grpSp>
+        <p:nvGrpSpPr>
+          <p:cNvPr id="90" name="Group 89">
+            <a:extLst>
+              <a:ext uri="{FF2B5EF4-FFF2-40B4-BE49-F238E27FC236}">
+                <a16:creationId xmlns:a16="http://schemas.microsoft.com/office/drawing/2014/main" id="{D3EE9FAB-7E2A-477C-BC25-7F9126F0E611}"/>
+              </a:ext>
+            </a:extLst>
+          </p:cNvPr>
+          <p:cNvGrpSpPr/>
+          <p:nvPr/>
+        </p:nvGrpSpPr>
+        <p:grpSpPr>
+          <a:xfrm>
+            <a:off x="5185710" y="2595007"/>
+            <a:ext cx="4260500" cy="2003605"/>
+            <a:chOff x="366694" y="2453183"/>
+            <a:chExt cx="1656924" cy="807144"/>
+          </a:xfrm>
+        </p:grpSpPr>
+        <p:grpSp>
+          <p:nvGrpSpPr>
+            <p:cNvPr id="91" name="Group 90">
+              <a:extLst>
+                <a:ext uri="{FF2B5EF4-FFF2-40B4-BE49-F238E27FC236}">
+                  <a16:creationId xmlns:a16="http://schemas.microsoft.com/office/drawing/2014/main" id="{5FADC32F-18D2-4EEC-BA99-4F51343A1DE2}"/>
+                </a:ext>
+              </a:extLst>
+            </p:cNvPr>
+            <p:cNvGrpSpPr/>
+            <p:nvPr/>
+          </p:nvGrpSpPr>
+          <p:grpSpPr>
+            <a:xfrm>
+              <a:off x="366694" y="2453183"/>
+              <a:ext cx="1656924" cy="807144"/>
+              <a:chOff x="1367782" y="2458726"/>
+              <a:chExt cx="1656924" cy="807144"/>
+            </a:xfrm>
+          </p:grpSpPr>
+          <p:sp>
+            <p:nvSpPr>
+              <p:cNvPr id="93" name="Rectangle 353">
+                <a:extLst>
+                  <a:ext uri="{FF2B5EF4-FFF2-40B4-BE49-F238E27FC236}">
+                    <a16:creationId xmlns:a16="http://schemas.microsoft.com/office/drawing/2014/main" id="{60F2EC73-1A4F-441C-B62D-C5AEF8B8E2C6}"/>
+                  </a:ext>
+                </a:extLst>
+              </p:cNvPr>
+              <p:cNvSpPr>
+                <a:spLocks noChangeArrowheads="1"/>
+              </p:cNvSpPr>
+              <p:nvPr/>
+            </p:nvSpPr>
+            <p:spPr bwMode="auto">
+              <a:xfrm>
+                <a:off x="1367782" y="2636836"/>
+                <a:ext cx="1656924" cy="629034"/>
+              </a:xfrm>
+              <a:prstGeom prst="rect">
+                <a:avLst/>
+              </a:prstGeom>
+              <a:solidFill>
+                <a:srgbClr val="F6F6F6"/>
+              </a:solidFill>
+              <a:ln w="19050">
+                <a:solidFill>
+                  <a:srgbClr val="D2D2D2"/>
+                </a:solidFill>
+                <a:prstDash val="lgDash"/>
+              </a:ln>
+            </p:spPr>
+            <p:txBody>
+              <a:bodyPr vert="horz" wrap="square" lIns="122047" tIns="61024" rIns="122047" bIns="61024" numCol="1" anchor="t" anchorCtr="0" compatLnSpc="1">
+                <a:prstTxWarp prst="textNoShape">
+                  <a:avLst/>
+                </a:prstTxWarp>
+              </a:bodyPr>
+              <a:lstStyle/>
+              <a:p>
+                <a:endParaRPr lang="en-US" sz="3206" dirty="0"/>
+              </a:p>
+            </p:txBody>
+          </p:sp>
+          <p:sp>
+            <p:nvSpPr>
+              <p:cNvPr id="94" name="Rectangle 359">
+                <a:extLst>
+                  <a:ext uri="{FF2B5EF4-FFF2-40B4-BE49-F238E27FC236}">
+                    <a16:creationId xmlns:a16="http://schemas.microsoft.com/office/drawing/2014/main" id="{CBD4F5EA-9374-4A8E-BB41-0602CE58D9BE}"/>
+                  </a:ext>
+                </a:extLst>
+              </p:cNvPr>
+              <p:cNvSpPr>
+                <a:spLocks noChangeArrowheads="1"/>
+              </p:cNvSpPr>
+              <p:nvPr/>
+            </p:nvSpPr>
+            <p:spPr bwMode="auto">
+              <a:xfrm>
+                <a:off x="1367782" y="2458726"/>
+                <a:ext cx="1655668" cy="153946"/>
+              </a:xfrm>
+              <a:prstGeom prst="rect">
+                <a:avLst/>
+              </a:prstGeom>
+              <a:solidFill>
+                <a:srgbClr val="0072C6"/>
+              </a:solidFill>
+              <a:ln>
+                <a:noFill/>
+              </a:ln>
+            </p:spPr>
+            <p:txBody>
+              <a:bodyPr vert="horz" wrap="square" lIns="122047" tIns="61024" rIns="122047" bIns="61024" numCol="1" anchor="t" anchorCtr="0" compatLnSpc="1">
+                <a:prstTxWarp prst="textNoShape">
+                  <a:avLst/>
+                </a:prstTxWarp>
+              </a:bodyPr>
+              <a:lstStyle/>
+              <a:p>
+                <a:endParaRPr lang="en-US" sz="3206" dirty="0"/>
+              </a:p>
+            </p:txBody>
+          </p:sp>
+        </p:grpSp>
+        <p:sp>
+          <p:nvSpPr>
+            <p:cNvPr id="92" name="Rectangle 954">
+              <a:extLst>
+                <a:ext uri="{FF2B5EF4-FFF2-40B4-BE49-F238E27FC236}">
+                  <a16:creationId xmlns:a16="http://schemas.microsoft.com/office/drawing/2014/main" id="{C4BDE4F4-EBDF-4C8C-8FC7-FB9A18F3561B}"/>
+                </a:ext>
+              </a:extLst>
+            </p:cNvPr>
+            <p:cNvSpPr>
+              <a:spLocks noChangeArrowheads="1"/>
+            </p:cNvSpPr>
+            <p:nvPr/>
+          </p:nvSpPr>
+          <p:spPr bwMode="auto">
+            <a:xfrm>
+              <a:off x="414701" y="2480034"/>
+              <a:ext cx="1342308" cy="99189"/>
+            </a:xfrm>
+            <a:prstGeom prst="rect">
+              <a:avLst/>
+            </a:prstGeom>
+            <a:noFill/>
+            <a:ln>
+              <a:noFill/>
+            </a:ln>
+            <a:extLst>
+              <a:ext uri="{909E8E84-426E-40DD-AFC4-6F175D3DCCD1}">
+                <a14:hiddenFill xmlns:a14="http://schemas.microsoft.com/office/drawing/2010/main">
+                  <a:solidFill>
+                    <a:srgbClr val="FFFFFF"/>
+                  </a:solidFill>
+                </a14:hiddenFill>
+              </a:ext>
+              <a:ext uri="{91240B29-F687-4F45-9708-019B960494DF}">
+                <a14:hiddenLine xmlns:a14="http://schemas.microsoft.com/office/drawing/2010/main" w="9525">
+                  <a:solidFill>
+                    <a:srgbClr val="000000"/>
+                  </a:solidFill>
+                  <a:miter lim="800000"/>
+                  <a:headEnd/>
+                  <a:tailEnd/>
+                </a14:hiddenLine>
+              </a:ext>
+            </a:extLst>
+          </p:spPr>
+          <p:txBody>
+            <a:bodyPr vert="horz" wrap="square" lIns="0" tIns="0" rIns="0" bIns="0" numCol="1" anchor="t" anchorCtr="0" compatLnSpc="1">
+              <a:prstTxWarp prst="textNoShape">
+                <a:avLst/>
+              </a:prstTxWarp>
+              <a:spAutoFit/>
+            </a:bodyPr>
+            <a:lstStyle>
+              <a:lvl1pPr eaLnBrk="0" fontAlgn="base" hangingPunct="0">
+                <a:spcBef>
+                  <a:spcPct val="0"/>
+                </a:spcBef>
+                <a:spcAft>
+                  <a:spcPct val="0"/>
+                </a:spcAft>
+                <a:defRPr>
+                  <a:solidFill>
+                    <a:schemeClr val="tx1"/>
+                  </a:solidFill>
+                  <a:latin typeface="Arial" panose="020B0604020202020204" pitchFamily="34" charset="0"/>
+                </a:defRPr>
+              </a:lvl1pPr>
+              <a:lvl2pPr eaLnBrk="0" fontAlgn="base" hangingPunct="0">
+                <a:spcBef>
+                  <a:spcPct val="0"/>
+                </a:spcBef>
+                <a:spcAft>
+                  <a:spcPct val="0"/>
+                </a:spcAft>
+                <a:defRPr>
+                  <a:solidFill>
+                    <a:schemeClr val="tx1"/>
+                  </a:solidFill>
+                  <a:latin typeface="Arial" panose="020B0604020202020204" pitchFamily="34" charset="0"/>
+                </a:defRPr>
+              </a:lvl2pPr>
+              <a:lvl3pPr eaLnBrk="0" fontAlgn="base" hangingPunct="0">
+                <a:spcBef>
+                  <a:spcPct val="0"/>
+                </a:spcBef>
+                <a:spcAft>
+                  <a:spcPct val="0"/>
+                </a:spcAft>
+                <a:defRPr>
+                  <a:solidFill>
+                    <a:schemeClr val="tx1"/>
+                  </a:solidFill>
+                  <a:latin typeface="Arial" panose="020B0604020202020204" pitchFamily="34" charset="0"/>
+                </a:defRPr>
+              </a:lvl3pPr>
+              <a:lvl4pPr eaLnBrk="0" fontAlgn="base" hangingPunct="0">
+                <a:spcBef>
+                  <a:spcPct val="0"/>
+                </a:spcBef>
+                <a:spcAft>
+                  <a:spcPct val="0"/>
+                </a:spcAft>
+                <a:defRPr>
+                  <a:solidFill>
+                    <a:schemeClr val="tx1"/>
+                  </a:solidFill>
+                  <a:latin typeface="Arial" panose="020B0604020202020204" pitchFamily="34" charset="0"/>
+                </a:defRPr>
+              </a:lvl4pPr>
+              <a:lvl5pPr eaLnBrk="0" fontAlgn="base" hangingPunct="0">
+                <a:spcBef>
+                  <a:spcPct val="0"/>
+                </a:spcBef>
+                <a:spcAft>
+                  <a:spcPct val="0"/>
+                </a:spcAft>
+                <a:defRPr>
+                  <a:solidFill>
+                    <a:schemeClr val="tx1"/>
+                  </a:solidFill>
+                  <a:latin typeface="Arial" panose="020B0604020202020204" pitchFamily="34" charset="0"/>
+                </a:defRPr>
+              </a:lvl5pPr>
+              <a:lvl6pPr eaLnBrk="0" fontAlgn="base" hangingPunct="0">
+                <a:spcBef>
+                  <a:spcPct val="0"/>
+                </a:spcBef>
+                <a:spcAft>
+                  <a:spcPct val="0"/>
+                </a:spcAft>
+                <a:defRPr>
+                  <a:solidFill>
+                    <a:schemeClr val="tx1"/>
+                  </a:solidFill>
+                  <a:latin typeface="Arial" panose="020B0604020202020204" pitchFamily="34" charset="0"/>
+                </a:defRPr>
+              </a:lvl6pPr>
+              <a:lvl7pPr eaLnBrk="0" fontAlgn="base" hangingPunct="0">
+                <a:spcBef>
+                  <a:spcPct val="0"/>
+                </a:spcBef>
+                <a:spcAft>
+                  <a:spcPct val="0"/>
+                </a:spcAft>
+                <a:defRPr>
+                  <a:solidFill>
+                    <a:schemeClr val="tx1"/>
+                  </a:solidFill>
+                  <a:latin typeface="Arial" panose="020B0604020202020204" pitchFamily="34" charset="0"/>
+                </a:defRPr>
+              </a:lvl7pPr>
+              <a:lvl8pPr eaLnBrk="0" fontAlgn="base" hangingPunct="0">
+                <a:spcBef>
+                  <a:spcPct val="0"/>
+                </a:spcBef>
+                <a:spcAft>
+                  <a:spcPct val="0"/>
+                </a:spcAft>
+                <a:defRPr>
+                  <a:solidFill>
+                    <a:schemeClr val="tx1"/>
+                  </a:solidFill>
+                  <a:latin typeface="Arial" panose="020B0604020202020204" pitchFamily="34" charset="0"/>
+                </a:defRPr>
+              </a:lvl8pPr>
+              <a:lvl9pPr eaLnBrk="0" fontAlgn="base" hangingPunct="0">
+                <a:spcBef>
+                  <a:spcPct val="0"/>
+                </a:spcBef>
+                <a:spcAft>
+                  <a:spcPct val="0"/>
+                </a:spcAft>
+                <a:defRPr>
+                  <a:solidFill>
+                    <a:schemeClr val="tx1"/>
+                  </a:solidFill>
+                  <a:latin typeface="Arial" panose="020B0604020202020204" pitchFamily="34" charset="0"/>
+                </a:defRPr>
+              </a:lvl9pPr>
+            </a:lstStyle>
+            <a:p>
+              <a:pPr defTabSz="1220450"/>
+              <a:r>
+                <a:rPr lang="en-US" altLang="en-US" sz="1600" dirty="0">
+                  <a:solidFill>
+                    <a:srgbClr val="FFFFFF"/>
+                  </a:solidFill>
+                  <a:latin typeface="Segoe UI" panose="020B0502040204020203" pitchFamily="34" charset="0"/>
+                  <a:cs typeface="Segoe UI" panose="020B0502040204020203" pitchFamily="34" charset="0"/>
+                </a:rPr>
+                <a:t>Your Microsoft 365 subscription</a:t>
+              </a:r>
+              <a:endParaRPr lang="en-US" altLang="en-US" sz="1600" dirty="0">
+                <a:latin typeface="Segoe UI" panose="020B0502040204020203" pitchFamily="34" charset="0"/>
+                <a:cs typeface="Segoe UI" panose="020B0502040204020203" pitchFamily="34" charset="0"/>
+              </a:endParaRPr>
+            </a:p>
+          </p:txBody>
+        </p:sp>
+      </p:grpSp>
+      <p:pic>
+        <p:nvPicPr>
+          <p:cNvPr id="12" name="Picture 11">
+            <a:extLst>
+              <a:ext uri="{FF2B5EF4-FFF2-40B4-BE49-F238E27FC236}">
+                <a16:creationId xmlns:a16="http://schemas.microsoft.com/office/drawing/2014/main" id="{9559A320-B543-4FFB-84BB-5D8A928A909A}"/>
+              </a:ext>
+            </a:extLst>
+          </p:cNvPr>
+          <p:cNvPicPr>
+            <a:picLocks noChangeAspect="1"/>
+          </p:cNvPicPr>
+          <p:nvPr/>
+        </p:nvPicPr>
+        <p:blipFill>
+          <a:blip r:embed="rId11"/>
+          <a:stretch>
+            <a:fillRect/>
+          </a:stretch>
+        </p:blipFill>
+        <p:spPr>
+          <a:xfrm>
+            <a:off x="3985805" y="3757710"/>
+            <a:ext cx="657336" cy="662724"/>
+          </a:xfrm>
+          <a:prstGeom prst="rect">
+            <a:avLst/>
+          </a:prstGeom>
+        </p:spPr>
+      </p:pic>
+      <p:grpSp>
+        <p:nvGrpSpPr>
+          <p:cNvPr id="14" name="Group 13">
+            <a:extLst>
+              <a:ext uri="{FF2B5EF4-FFF2-40B4-BE49-F238E27FC236}">
+                <a16:creationId xmlns:a16="http://schemas.microsoft.com/office/drawing/2014/main" id="{1052B303-713A-499E-A604-AC39A4B3CB4A}"/>
+              </a:ext>
+            </a:extLst>
+          </p:cNvPr>
+          <p:cNvGrpSpPr/>
+          <p:nvPr/>
+        </p:nvGrpSpPr>
+        <p:grpSpPr>
+          <a:xfrm>
+            <a:off x="6887000" y="3497718"/>
+            <a:ext cx="889829" cy="1063567"/>
+            <a:chOff x="6887000" y="3497718"/>
+            <a:chExt cx="889829" cy="1063567"/>
+          </a:xfrm>
+        </p:grpSpPr>
+        <p:pic>
+          <p:nvPicPr>
+            <p:cNvPr id="6" name="Picture 5">
+              <a:extLst>
+                <a:ext uri="{FF2B5EF4-FFF2-40B4-BE49-F238E27FC236}">
+                  <a16:creationId xmlns:a16="http://schemas.microsoft.com/office/drawing/2014/main" id="{200ECCB0-591B-4E96-96FA-9CBA2DD53E8F}"/>
+                </a:ext>
+              </a:extLst>
+            </p:cNvPr>
+            <p:cNvPicPr>
+              <a:picLocks noChangeAspect="1"/>
+            </p:cNvPicPr>
+            <p:nvPr/>
+          </p:nvPicPr>
+          <p:blipFill>
+            <a:blip r:embed="rId12"/>
+            <a:stretch>
+              <a:fillRect/>
+            </a:stretch>
+          </p:blipFill>
+          <p:spPr>
+            <a:xfrm>
+              <a:off x="6887000" y="3497718"/>
+              <a:ext cx="889829" cy="818643"/>
+            </a:xfrm>
+            <a:prstGeom prst="rect">
+              <a:avLst/>
+            </a:prstGeom>
+          </p:spPr>
+        </p:pic>
+        <p:sp>
+          <p:nvSpPr>
+            <p:cNvPr id="144" name="TextBox 143">
+              <a:extLst>
+                <a:ext uri="{FF2B5EF4-FFF2-40B4-BE49-F238E27FC236}">
+                  <a16:creationId xmlns:a16="http://schemas.microsoft.com/office/drawing/2014/main" id="{71DC5388-C46D-438B-A501-77575DD09EE7}"/>
+                </a:ext>
+              </a:extLst>
+            </p:cNvPr>
+            <p:cNvSpPr txBox="1"/>
+            <p:nvPr/>
+          </p:nvSpPr>
+          <p:spPr>
+            <a:xfrm>
+              <a:off x="6922411" y="4284286"/>
+              <a:ext cx="819007" cy="276999"/>
+            </a:xfrm>
+            <a:prstGeom prst="rect">
+              <a:avLst/>
+            </a:prstGeom>
+            <a:noFill/>
+          </p:spPr>
+          <p:txBody>
+            <a:bodyPr wrap="none" rtlCol="0">
+              <a:spAutoFit/>
+            </a:bodyPr>
+            <a:lstStyle/>
+            <a:p>
+              <a:pPr algn="ctr"/>
+              <a:r>
+                <a:rPr lang="en-US" sz="1200" dirty="0">
+                  <a:latin typeface="Segoe UI" panose="020B0502040204020203" pitchFamily="34" charset="0"/>
+                  <a:cs typeface="Segoe UI" panose="020B0502040204020203" pitchFamily="34" charset="0"/>
+                </a:rPr>
+                <a:t>Azure AD</a:t>
+              </a:r>
+              <a:endParaRPr lang="en-US" sz="1050" dirty="0">
+                <a:latin typeface="Segoe UI" panose="020B0502040204020203" pitchFamily="34" charset="0"/>
+                <a:cs typeface="Segoe UI" panose="020B0502040204020203" pitchFamily="34" charset="0"/>
+              </a:endParaRPr>
+            </a:p>
+          </p:txBody>
+        </p:sp>
+      </p:grpSp>
+      <p:grpSp>
+        <p:nvGrpSpPr>
+          <p:cNvPr id="183" name="Group 182">
+            <a:extLst>
+              <a:ext uri="{FF2B5EF4-FFF2-40B4-BE49-F238E27FC236}">
+                <a16:creationId xmlns:a16="http://schemas.microsoft.com/office/drawing/2014/main" id="{2FCF6843-AC20-4B11-ABEF-119A97488CD8}"/>
+              </a:ext>
+            </a:extLst>
+          </p:cNvPr>
+          <p:cNvGrpSpPr/>
+          <p:nvPr/>
+        </p:nvGrpSpPr>
+        <p:grpSpPr>
+          <a:xfrm>
+            <a:off x="6866972" y="6767062"/>
+            <a:ext cx="889829" cy="1063567"/>
+            <a:chOff x="6887000" y="3497718"/>
+            <a:chExt cx="889829" cy="1063567"/>
+          </a:xfrm>
+        </p:grpSpPr>
+        <p:pic>
+          <p:nvPicPr>
+            <p:cNvPr id="184" name="Picture 183">
+              <a:extLst>
+                <a:ext uri="{FF2B5EF4-FFF2-40B4-BE49-F238E27FC236}">
+                  <a16:creationId xmlns:a16="http://schemas.microsoft.com/office/drawing/2014/main" id="{5DC3F8BC-20A5-4011-8E1A-14E74960CCC1}"/>
+                </a:ext>
+              </a:extLst>
+            </p:cNvPr>
+            <p:cNvPicPr>
+              <a:picLocks noChangeAspect="1"/>
+            </p:cNvPicPr>
+            <p:nvPr/>
+          </p:nvPicPr>
+          <p:blipFill>
+            <a:blip r:embed="rId12"/>
+            <a:stretch>
+              <a:fillRect/>
+            </a:stretch>
+          </p:blipFill>
+          <p:spPr>
+            <a:xfrm>
+              <a:off x="6887000" y="3497718"/>
+              <a:ext cx="889829" cy="818643"/>
+            </a:xfrm>
+            <a:prstGeom prst="rect">
+              <a:avLst/>
+            </a:prstGeom>
+          </p:spPr>
+        </p:pic>
+        <p:sp>
+          <p:nvSpPr>
+            <p:cNvPr id="185" name="TextBox 184">
+              <a:extLst>
+                <a:ext uri="{FF2B5EF4-FFF2-40B4-BE49-F238E27FC236}">
+                  <a16:creationId xmlns:a16="http://schemas.microsoft.com/office/drawing/2014/main" id="{9E25FD1B-FFE2-4675-9439-916DE9CFDF11}"/>
+                </a:ext>
+              </a:extLst>
+            </p:cNvPr>
+            <p:cNvSpPr txBox="1"/>
+            <p:nvPr/>
+          </p:nvSpPr>
+          <p:spPr>
+            <a:xfrm>
+              <a:off x="6922411" y="4284286"/>
+              <a:ext cx="819007" cy="276999"/>
+            </a:xfrm>
+            <a:prstGeom prst="rect">
+              <a:avLst/>
+            </a:prstGeom>
+            <a:noFill/>
+          </p:spPr>
+          <p:txBody>
+            <a:bodyPr wrap="none" rtlCol="0">
+              <a:spAutoFit/>
+            </a:bodyPr>
+            <a:lstStyle/>
+            <a:p>
+              <a:pPr algn="ctr"/>
+              <a:r>
+                <a:rPr lang="en-US" sz="1200" dirty="0">
+                  <a:latin typeface="Segoe UI" panose="020B0502040204020203" pitchFamily="34" charset="0"/>
+                  <a:cs typeface="Segoe UI" panose="020B0502040204020203" pitchFamily="34" charset="0"/>
+                </a:rPr>
+                <a:t>Azure AD</a:t>
+              </a:r>
+              <a:endParaRPr lang="en-US" sz="1050" dirty="0">
+                <a:latin typeface="Segoe UI" panose="020B0502040204020203" pitchFamily="34" charset="0"/>
+                <a:cs typeface="Segoe UI" panose="020B0502040204020203" pitchFamily="34" charset="0"/>
+              </a:endParaRPr>
+            </a:p>
+          </p:txBody>
+        </p:sp>
+      </p:grpSp>
+      <p:grpSp>
+        <p:nvGrpSpPr>
+          <p:cNvPr id="186" name="Group 185">
+            <a:extLst>
+              <a:ext uri="{FF2B5EF4-FFF2-40B4-BE49-F238E27FC236}">
+                <a16:creationId xmlns:a16="http://schemas.microsoft.com/office/drawing/2014/main" id="{F21EDADA-E853-4510-8B05-DE8E04D107BD}"/>
+              </a:ext>
+            </a:extLst>
+          </p:cNvPr>
+          <p:cNvGrpSpPr/>
+          <p:nvPr/>
+        </p:nvGrpSpPr>
+        <p:grpSpPr>
+          <a:xfrm>
+            <a:off x="6878269" y="10058091"/>
+            <a:ext cx="889829" cy="1063567"/>
+            <a:chOff x="6887000" y="3497718"/>
+            <a:chExt cx="889829" cy="1063567"/>
+          </a:xfrm>
+        </p:grpSpPr>
+        <p:pic>
+          <p:nvPicPr>
+            <p:cNvPr id="187" name="Picture 186">
+              <a:extLst>
+                <a:ext uri="{FF2B5EF4-FFF2-40B4-BE49-F238E27FC236}">
+                  <a16:creationId xmlns:a16="http://schemas.microsoft.com/office/drawing/2014/main" id="{547CC8E4-21D5-4050-B26B-5B33C4E300B1}"/>
+                </a:ext>
+              </a:extLst>
+            </p:cNvPr>
+            <p:cNvPicPr>
+              <a:picLocks noChangeAspect="1"/>
+            </p:cNvPicPr>
+            <p:nvPr/>
+          </p:nvPicPr>
+          <p:blipFill>
+            <a:blip r:embed="rId12"/>
+            <a:stretch>
+              <a:fillRect/>
+            </a:stretch>
+          </p:blipFill>
+          <p:spPr>
+            <a:xfrm>
+              <a:off x="6887000" y="3497718"/>
+              <a:ext cx="889829" cy="818643"/>
+            </a:xfrm>
+            <a:prstGeom prst="rect">
+              <a:avLst/>
+            </a:prstGeom>
+          </p:spPr>
+        </p:pic>
+        <p:sp>
+          <p:nvSpPr>
+            <p:cNvPr id="204" name="TextBox 203">
+              <a:extLst>
+                <a:ext uri="{FF2B5EF4-FFF2-40B4-BE49-F238E27FC236}">
+                  <a16:creationId xmlns:a16="http://schemas.microsoft.com/office/drawing/2014/main" id="{CBD9B228-32AA-4DA8-8597-7C76953E4F25}"/>
+                </a:ext>
+              </a:extLst>
+            </p:cNvPr>
+            <p:cNvSpPr txBox="1"/>
+            <p:nvPr/>
+          </p:nvSpPr>
+          <p:spPr>
+            <a:xfrm>
+              <a:off x="6922411" y="4284286"/>
+              <a:ext cx="819007" cy="276999"/>
+            </a:xfrm>
+            <a:prstGeom prst="rect">
+              <a:avLst/>
+            </a:prstGeom>
+            <a:noFill/>
+          </p:spPr>
+          <p:txBody>
+            <a:bodyPr wrap="none" rtlCol="0">
+              <a:spAutoFit/>
+            </a:bodyPr>
+            <a:lstStyle/>
+            <a:p>
+              <a:pPr algn="ctr"/>
+              <a:r>
+                <a:rPr lang="en-US" sz="1200" dirty="0">
+                  <a:latin typeface="Segoe UI" panose="020B0502040204020203" pitchFamily="34" charset="0"/>
+                  <a:cs typeface="Segoe UI" panose="020B0502040204020203" pitchFamily="34" charset="0"/>
+                </a:rPr>
+                <a:t>Azure AD</a:t>
+              </a:r>
+              <a:endParaRPr lang="en-US" sz="1050" dirty="0">
+                <a:latin typeface="Segoe UI" panose="020B0502040204020203" pitchFamily="34" charset="0"/>
+                <a:cs typeface="Segoe UI" panose="020B0502040204020203" pitchFamily="34" charset="0"/>
+              </a:endParaRPr>
+            </a:p>
+          </p:txBody>
+        </p:sp>
+      </p:grpSp>
+      <p:grpSp>
+        <p:nvGrpSpPr>
+          <p:cNvPr id="209" name="Group 208">
+            <a:extLst>
+              <a:ext uri="{FF2B5EF4-FFF2-40B4-BE49-F238E27FC236}">
+                <a16:creationId xmlns:a16="http://schemas.microsoft.com/office/drawing/2014/main" id="{7CA2CAA0-1375-4F07-BCE0-679FDA33E26B}"/>
+              </a:ext>
+            </a:extLst>
+          </p:cNvPr>
+          <p:cNvGrpSpPr/>
+          <p:nvPr/>
+        </p:nvGrpSpPr>
+        <p:grpSpPr>
+          <a:xfrm>
+            <a:off x="6866972" y="13447392"/>
+            <a:ext cx="889829" cy="1063567"/>
+            <a:chOff x="6887000" y="3497718"/>
+            <a:chExt cx="889829" cy="1063567"/>
+          </a:xfrm>
+        </p:grpSpPr>
+        <p:pic>
+          <p:nvPicPr>
+            <p:cNvPr id="210" name="Picture 209">
+              <a:extLst>
+                <a:ext uri="{FF2B5EF4-FFF2-40B4-BE49-F238E27FC236}">
+                  <a16:creationId xmlns:a16="http://schemas.microsoft.com/office/drawing/2014/main" id="{FF672BE5-BA01-4A73-9E7C-38A4A782737C}"/>
+                </a:ext>
+              </a:extLst>
+            </p:cNvPr>
+            <p:cNvPicPr>
+              <a:picLocks noChangeAspect="1"/>
+            </p:cNvPicPr>
+            <p:nvPr/>
+          </p:nvPicPr>
+          <p:blipFill>
+            <a:blip r:embed="rId12"/>
+            <a:stretch>
+              <a:fillRect/>
+            </a:stretch>
+          </p:blipFill>
+          <p:spPr>
+            <a:xfrm>
+              <a:off x="6887000" y="3497718"/>
+              <a:ext cx="889829" cy="818643"/>
+            </a:xfrm>
+            <a:prstGeom prst="rect">
+              <a:avLst/>
+            </a:prstGeom>
+          </p:spPr>
+        </p:pic>
+        <p:sp>
+          <p:nvSpPr>
+            <p:cNvPr id="212" name="TextBox 211">
+              <a:extLst>
+                <a:ext uri="{FF2B5EF4-FFF2-40B4-BE49-F238E27FC236}">
+                  <a16:creationId xmlns:a16="http://schemas.microsoft.com/office/drawing/2014/main" id="{11551582-EB82-464A-8BDD-FD27EBFA317F}"/>
+                </a:ext>
+              </a:extLst>
+            </p:cNvPr>
+            <p:cNvSpPr txBox="1"/>
+            <p:nvPr/>
+          </p:nvSpPr>
+          <p:spPr>
+            <a:xfrm>
+              <a:off x="6922411" y="4284286"/>
+              <a:ext cx="819007" cy="276999"/>
+            </a:xfrm>
+            <a:prstGeom prst="rect">
+              <a:avLst/>
+            </a:prstGeom>
+            <a:noFill/>
+          </p:spPr>
+          <p:txBody>
+            <a:bodyPr wrap="none" rtlCol="0">
+              <a:spAutoFit/>
+            </a:bodyPr>
+            <a:lstStyle/>
+            <a:p>
+              <a:pPr algn="ctr"/>
+              <a:r>
+                <a:rPr lang="en-US" sz="1200" dirty="0">
+                  <a:latin typeface="Segoe UI" panose="020B0502040204020203" pitchFamily="34" charset="0"/>
+                  <a:cs typeface="Segoe UI" panose="020B0502040204020203" pitchFamily="34" charset="0"/>
+                </a:rPr>
+                <a:t>Azure AD</a:t>
+              </a:r>
+              <a:endParaRPr lang="en-US" sz="1050" dirty="0">
+                <a:latin typeface="Segoe UI" panose="020B0502040204020203" pitchFamily="34" charset="0"/>
+                <a:cs typeface="Segoe UI" panose="020B0502040204020203" pitchFamily="34" charset="0"/>
+              </a:endParaRPr>
+            </a:p>
+          </p:txBody>
+        </p:sp>
+      </p:grpSp>
+      <p:sp>
+        <p:nvSpPr>
+          <p:cNvPr id="15" name="TextBox 14">
+            <a:extLst>
+              <a:ext uri="{FF2B5EF4-FFF2-40B4-BE49-F238E27FC236}">
+                <a16:creationId xmlns:a16="http://schemas.microsoft.com/office/drawing/2014/main" id="{B8C49D84-3BBF-48D3-AE39-12A4D18878A7}"/>
+              </a:ext>
+            </a:extLst>
+          </p:cNvPr>
+          <p:cNvSpPr txBox="1"/>
+          <p:nvPr/>
+        </p:nvSpPr>
+        <p:spPr>
+          <a:xfrm>
+            <a:off x="6172200" y="14973707"/>
+            <a:ext cx="3568156" cy="461665"/>
+          </a:xfrm>
+          <a:prstGeom prst="rect">
+            <a:avLst/>
+          </a:prstGeom>
+          <a:noFill/>
+        </p:spPr>
+        <p:txBody>
+          <a:bodyPr wrap="none" rtlCol="0">
+            <a:spAutoFit/>
+          </a:bodyPr>
+          <a:lstStyle/>
+          <a:p>
+            <a:pPr algn="r"/>
+            <a:r>
+              <a:rPr lang="en-US" sz="1200" b="0" i="0" u="none" strike="noStrike" baseline="0" dirty="0">
+                <a:solidFill>
+                  <a:srgbClr val="7F7F7F"/>
+                </a:solidFill>
+                <a:latin typeface="Segoe UI" panose="020B0502040204020203" pitchFamily="34" charset="0"/>
+              </a:rPr>
+              <a:t>© 2019 Microsoft Corporation. All rights </a:t>
+            </a:r>
+            <a:r>
+              <a:rPr lang="en-US" sz="1200" b="0" i="0" u="none" strike="noStrike" baseline="0">
+                <a:solidFill>
+                  <a:srgbClr val="7F7F7F"/>
+                </a:solidFill>
+                <a:latin typeface="Segoe UI" panose="020B0502040204020203" pitchFamily="34" charset="0"/>
+              </a:rPr>
+              <a:t>reserved.</a:t>
+            </a:r>
+          </a:p>
+          <a:p>
+            <a:pPr algn="r"/>
+            <a:r>
+              <a:rPr lang="en-US" sz="1200">
+                <a:solidFill>
+                  <a:srgbClr val="7F7F7F"/>
+                </a:solidFill>
+                <a:latin typeface="Segoe UI" panose="020B0502040204020203" pitchFamily="34" charset="0"/>
+              </a:rPr>
+              <a:t>September 2020</a:t>
+            </a:r>
+            <a:endParaRPr lang="en-US" sz="1200" dirty="0"/>
+          </a:p>
+        </p:txBody>
+      </p:sp>
     </p:spTree>
     <p:extLst>
       <p:ext uri="{BB962C8B-B14F-4D97-AF65-F5344CB8AC3E}">
@@ -32217,6 +31165,15 @@
 </file>
 
 <file path=customXml/item1.xml><?xml version="1.0" encoding="utf-8"?>
+<?mso-contentType ?>
+<FormTemplates xmlns="http://schemas.microsoft.com/sharepoint/v3/contenttype/forms">
+  <Display>DocumentLibraryForm</Display>
+  <Edit>DocumentLibraryForm</Edit>
+  <New>DocumentLibraryForm</New>
+</FormTemplates>
+</file>
+
+<file path=customXml/item2.xml><?xml version="1.0" encoding="utf-8"?>
 <ct:contentTypeSchema xmlns:ct="http://schemas.microsoft.com/office/2006/metadata/contentType" xmlns:ma="http://schemas.microsoft.com/office/2006/metadata/properties/metaAttributes" ct:_="" ma:_="" ma:contentTypeName="Document" ma:contentTypeID="0x01010073E9097417BC06428B857BB2E2408EBD" ma:contentTypeVersion="13" ma:contentTypeDescription="Create a new document." ma:contentTypeScope="" ma:versionID="58061d3732281eee5e103969ee14c7a6">
   <xsd:schema xmlns:xsd="http://www.w3.org/2001/XMLSchema" xmlns:xs="http://www.w3.org/2001/XMLSchema" xmlns:p="http://schemas.microsoft.com/office/2006/metadata/properties" xmlns:ns2="dbe27416-6867-469e-b165-f931b8d0abb8" xmlns:ns3="ea29863e-484f-4213-8a5e-7e6fb110a695" targetNamespace="http://schemas.microsoft.com/office/2006/metadata/properties" ma:root="true" ma:fieldsID="aa6609da1d9139deee2a16d946b6a154" ns2:_="" ns3:_="">
     <xsd:import namespace="dbe27416-6867-469e-b165-f931b8d0abb8"/>
@@ -32439,15 +31396,6 @@
 </ct:contentTypeSchema>
 </file>
 
-<file path=customXml/item2.xml><?xml version="1.0" encoding="utf-8"?>
-<?mso-contentType ?>
-<FormTemplates xmlns="http://schemas.microsoft.com/sharepoint/v3/contenttype/forms">
-  <Display>DocumentLibraryForm</Display>
-  <Edit>DocumentLibraryForm</Edit>
-  <New>DocumentLibraryForm</New>
-</FormTemplates>
-</file>
-
 <file path=customXml/item3.xml><?xml version="1.0" encoding="utf-8"?>
 <p:properties xmlns:p="http://schemas.microsoft.com/office/2006/metadata/properties" xmlns:xsi="http://www.w3.org/2001/XMLSchema-instance" xmlns:pc="http://schemas.microsoft.com/office/infopath/2007/PartnerControls">
   <documentManagement>
@@ -32457,6 +31405,14 @@
 </file>
 
 <file path=customXml/itemProps1.xml><?xml version="1.0" encoding="utf-8"?>
+<ds:datastoreItem xmlns:ds="http://schemas.openxmlformats.org/officeDocument/2006/customXml" ds:itemID="{2690FBA1-4C54-44EA-9FC4-73C5783857EC}">
+  <ds:schemaRefs>
+    <ds:schemaRef ds:uri="http://schemas.microsoft.com/sharepoint/v3/contenttype/forms"/>
+  </ds:schemaRefs>
+</ds:datastoreItem>
+</file>
+
+<file path=customXml/itemProps2.xml><?xml version="1.0" encoding="utf-8"?>
 <ds:datastoreItem xmlns:ds="http://schemas.openxmlformats.org/officeDocument/2006/customXml" ds:itemID="{6D15CCF0-7CC5-4962-8B9C-7BB486B54856}">
   <ds:schemaRefs>
     <ds:schemaRef ds:uri="http://schemas.microsoft.com/office/2006/metadata/contentType"/>
@@ -32471,14 +31427,6 @@
     <ds:schemaRef ds:uri="http://purl.org/dc/elements/1.1/"/>
     <ds:schemaRef ds:uri="http://purl.org/dc/terms/"/>
     <ds:schemaRef ds:uri="http://schemas.microsoft.com/internal/obd"/>
-  </ds:schemaRefs>
-</ds:datastoreItem>
-</file>
-
-<file path=customXml/itemProps2.xml><?xml version="1.0" encoding="utf-8"?>
-<ds:datastoreItem xmlns:ds="http://schemas.openxmlformats.org/officeDocument/2006/customXml" ds:itemID="{2690FBA1-4C54-44EA-9FC4-73C5783857EC}">
-  <ds:schemaRefs>
-    <ds:schemaRef ds:uri="http://schemas.microsoft.com/sharepoint/v3/contenttype/forms"/>
   </ds:schemaRefs>
 </ds:datastoreItem>
 </file>

</xml_diff>